<commit_message>
fix NA heatmap bug
labels were no sorted
</commit_message>
<xml_diff>
--- a/presentation/proteiNorm_IDeA.pptx
+++ b/presentation/proteiNorm_IDeA.pptx
@@ -5,7 +5,7 @@
     <p:sldMasterId id="2147483648" r:id="rId1"/>
   </p:sldMasterIdLst>
   <p:notesMasterIdLst>
-    <p:notesMasterId r:id="rId12"/>
+    <p:notesMasterId r:id="rId13"/>
   </p:notesMasterIdLst>
   <p:sldIdLst>
     <p:sldId id="256" r:id="rId2"/>
@@ -13,11 +13,12 @@
     <p:sldId id="258" r:id="rId4"/>
     <p:sldId id="259" r:id="rId5"/>
     <p:sldId id="260" r:id="rId6"/>
-    <p:sldId id="262" r:id="rId7"/>
-    <p:sldId id="263" r:id="rId8"/>
-    <p:sldId id="265" r:id="rId9"/>
-    <p:sldId id="264" r:id="rId10"/>
-    <p:sldId id="261" r:id="rId11"/>
+    <p:sldId id="266" r:id="rId7"/>
+    <p:sldId id="262" r:id="rId8"/>
+    <p:sldId id="263" r:id="rId9"/>
+    <p:sldId id="265" r:id="rId10"/>
+    <p:sldId id="264" r:id="rId11"/>
+    <p:sldId id="261" r:id="rId12"/>
   </p:sldIdLst>
   <p:sldSz cx="12192000" cy="6858000"/>
   <p:notesSz cx="6858000" cy="9144000"/>
@@ -206,7 +207,7 @@
           <a:p>
             <a:fld id="{703DA0AF-C6AC-472A-BEC4-E67B5BEE94F3}" type="datetimeFigureOut">
               <a:rPr lang="en-US" smtClean="0"/>
-              <a:t>1/28/2020</a:t>
+              <a:t>1/29/2020</a:t>
             </a:fld>
             <a:endParaRPr lang="en-US"/>
           </a:p>
@@ -519,6 +520,98 @@
           <a:lstStyle/>
           <a:p>
             <a:r>
+              <a:rPr lang="en-US" dirty="0" err="1" smtClean="0"/>
+              <a:t>glog</a:t>
+            </a:r>
+            <a:r>
+              <a:rPr lang="en-US" baseline="0" dirty="0" smtClean="0"/>
+              <a:t> = generalized logarithm </a:t>
+            </a:r>
+            <a:endParaRPr lang="en-US" dirty="0"/>
+          </a:p>
+        </p:txBody>
+      </p:sp>
+      <p:sp>
+        <p:nvSpPr>
+          <p:cNvPr id="4" name="Slide Number Placeholder 3"/>
+          <p:cNvSpPr>
+            <a:spLocks noGrp="1"/>
+          </p:cNvSpPr>
+          <p:nvPr>
+            <p:ph type="sldNum" sz="quarter" idx="10"/>
+          </p:nvPr>
+        </p:nvSpPr>
+        <p:spPr/>
+        <p:txBody>
+          <a:bodyPr/>
+          <a:lstStyle/>
+          <a:p>
+            <a:fld id="{2F515502-FC73-404A-8CA0-AECA6E3B8604}" type="slidenum">
+              <a:rPr lang="en-US" smtClean="0"/>
+              <a:t>6</a:t>
+            </a:fld>
+            <a:endParaRPr lang="en-US"/>
+          </a:p>
+        </p:txBody>
+      </p:sp>
+    </p:spTree>
+    <p:extLst>
+      <p:ext uri="{BB962C8B-B14F-4D97-AF65-F5344CB8AC3E}">
+        <p14:creationId xmlns:p14="http://schemas.microsoft.com/office/powerpoint/2010/main" val="3779364716"/>
+      </p:ext>
+    </p:extLst>
+  </p:cSld>
+  <p:clrMapOvr>
+    <a:masterClrMapping/>
+  </p:clrMapOvr>
+</p:notes>
+</file>
+
+<file path=ppt/notesSlides/notesSlide2.xml><?xml version="1.0" encoding="utf-8"?>
+<p:notes xmlns:a="http://schemas.openxmlformats.org/drawingml/2006/main" xmlns:r="http://schemas.openxmlformats.org/officeDocument/2006/relationships" xmlns:p="http://schemas.openxmlformats.org/presentationml/2006/main">
+  <p:cSld>
+    <p:spTree>
+      <p:nvGrpSpPr>
+        <p:cNvPr id="1" name=""/>
+        <p:cNvGrpSpPr/>
+        <p:nvPr/>
+      </p:nvGrpSpPr>
+      <p:grpSpPr>
+        <a:xfrm>
+          <a:off x="0" y="0"/>
+          <a:ext cx="0" cy="0"/>
+          <a:chOff x="0" y="0"/>
+          <a:chExt cx="0" cy="0"/>
+        </a:xfrm>
+      </p:grpSpPr>
+      <p:sp>
+        <p:nvSpPr>
+          <p:cNvPr id="2" name="Slide Image Placeholder 1"/>
+          <p:cNvSpPr>
+            <a:spLocks noGrp="1" noRot="1" noChangeAspect="1"/>
+          </p:cNvSpPr>
+          <p:nvPr>
+            <p:ph type="sldImg"/>
+          </p:nvPr>
+        </p:nvSpPr>
+        <p:spPr/>
+      </p:sp>
+      <p:sp>
+        <p:nvSpPr>
+          <p:cNvPr id="3" name="Notes Placeholder 2"/>
+          <p:cNvSpPr>
+            <a:spLocks noGrp="1"/>
+          </p:cNvSpPr>
+          <p:nvPr>
+            <p:ph type="body" idx="1"/>
+          </p:nvPr>
+        </p:nvSpPr>
+        <p:spPr/>
+        <p:txBody>
+          <a:bodyPr/>
+          <a:lstStyle/>
+          <a:p>
+            <a:r>
               <a:rPr lang="en-US" dirty="0" smtClean="0"/>
               <a:t>Sensitivity</a:t>
             </a:r>
@@ -559,7 +652,7 @@
           <a:p>
             <a:fld id="{2F515502-FC73-404A-8CA0-AECA6E3B8604}" type="slidenum">
               <a:rPr lang="en-US" smtClean="0"/>
-              <a:t>9</a:t>
+              <a:t>10</a:t>
             </a:fld>
             <a:endParaRPr lang="en-US"/>
           </a:p>
@@ -709,7 +802,7 @@
           <a:p>
             <a:fld id="{EAA39E29-0CE1-4310-8C6D-D1D8E7935F0F}" type="datetimeFigureOut">
               <a:rPr lang="en-US" smtClean="0"/>
-              <a:t>1/28/2020</a:t>
+              <a:t>1/29/2020</a:t>
             </a:fld>
             <a:endParaRPr lang="en-US"/>
           </a:p>
@@ -879,7 +972,7 @@
           <a:p>
             <a:fld id="{EAA39E29-0CE1-4310-8C6D-D1D8E7935F0F}" type="datetimeFigureOut">
               <a:rPr lang="en-US" smtClean="0"/>
-              <a:t>1/28/2020</a:t>
+              <a:t>1/29/2020</a:t>
             </a:fld>
             <a:endParaRPr lang="en-US"/>
           </a:p>
@@ -1059,7 +1152,7 @@
           <a:p>
             <a:fld id="{EAA39E29-0CE1-4310-8C6D-D1D8E7935F0F}" type="datetimeFigureOut">
               <a:rPr lang="en-US" smtClean="0"/>
-              <a:t>1/28/2020</a:t>
+              <a:t>1/29/2020</a:t>
             </a:fld>
             <a:endParaRPr lang="en-US"/>
           </a:p>
@@ -1229,7 +1322,7 @@
           <a:p>
             <a:fld id="{EAA39E29-0CE1-4310-8C6D-D1D8E7935F0F}" type="datetimeFigureOut">
               <a:rPr lang="en-US" smtClean="0"/>
-              <a:t>1/28/2020</a:t>
+              <a:t>1/29/2020</a:t>
             </a:fld>
             <a:endParaRPr lang="en-US"/>
           </a:p>
@@ -1475,7 +1568,7 @@
           <a:p>
             <a:fld id="{EAA39E29-0CE1-4310-8C6D-D1D8E7935F0F}" type="datetimeFigureOut">
               <a:rPr lang="en-US" smtClean="0"/>
-              <a:t>1/28/2020</a:t>
+              <a:t>1/29/2020</a:t>
             </a:fld>
             <a:endParaRPr lang="en-US"/>
           </a:p>
@@ -1707,7 +1800,7 @@
           <a:p>
             <a:fld id="{EAA39E29-0CE1-4310-8C6D-D1D8E7935F0F}" type="datetimeFigureOut">
               <a:rPr lang="en-US" smtClean="0"/>
-              <a:t>1/28/2020</a:t>
+              <a:t>1/29/2020</a:t>
             </a:fld>
             <a:endParaRPr lang="en-US"/>
           </a:p>
@@ -2074,7 +2167,7 @@
           <a:p>
             <a:fld id="{EAA39E29-0CE1-4310-8C6D-D1D8E7935F0F}" type="datetimeFigureOut">
               <a:rPr lang="en-US" smtClean="0"/>
-              <a:t>1/28/2020</a:t>
+              <a:t>1/29/2020</a:t>
             </a:fld>
             <a:endParaRPr lang="en-US"/>
           </a:p>
@@ -2192,7 +2285,7 @@
           <a:p>
             <a:fld id="{EAA39E29-0CE1-4310-8C6D-D1D8E7935F0F}" type="datetimeFigureOut">
               <a:rPr lang="en-US" smtClean="0"/>
-              <a:t>1/28/2020</a:t>
+              <a:t>1/29/2020</a:t>
             </a:fld>
             <a:endParaRPr lang="en-US"/>
           </a:p>
@@ -2287,7 +2380,7 @@
           <a:p>
             <a:fld id="{EAA39E29-0CE1-4310-8C6D-D1D8E7935F0F}" type="datetimeFigureOut">
               <a:rPr lang="en-US" smtClean="0"/>
-              <a:t>1/28/2020</a:t>
+              <a:t>1/29/2020</a:t>
             </a:fld>
             <a:endParaRPr lang="en-US"/>
           </a:p>
@@ -2564,7 +2657,7 @@
           <a:p>
             <a:fld id="{EAA39E29-0CE1-4310-8C6D-D1D8E7935F0F}" type="datetimeFigureOut">
               <a:rPr lang="en-US" smtClean="0"/>
-              <a:t>1/28/2020</a:t>
+              <a:t>1/29/2020</a:t>
             </a:fld>
             <a:endParaRPr lang="en-US"/>
           </a:p>
@@ -2817,7 +2910,7 @@
           <a:p>
             <a:fld id="{EAA39E29-0CE1-4310-8C6D-D1D8E7935F0F}" type="datetimeFigureOut">
               <a:rPr lang="en-US" smtClean="0"/>
-              <a:t>1/28/2020</a:t>
+              <a:t>1/29/2020</a:t>
             </a:fld>
             <a:endParaRPr lang="en-US"/>
           </a:p>
@@ -3030,7 +3123,7 @@
           <a:p>
             <a:fld id="{EAA39E29-0CE1-4310-8C6D-D1D8E7935F0F}" type="datetimeFigureOut">
               <a:rPr lang="en-US" smtClean="0"/>
-              <a:t>1/28/2020</a:t>
+              <a:t>1/29/2020</a:t>
             </a:fld>
             <a:endParaRPr lang="en-US"/>
           </a:p>
@@ -3488,13 +3581,8 @@
           <a:p>
             <a:r>
               <a:rPr lang="en-US" dirty="0" smtClean="0"/>
-              <a:t>Stefan </a:t>
-            </a:r>
-            <a:r>
-              <a:rPr lang="en-US" dirty="0" smtClean="0"/>
-              <a:t>Graw, PhD</a:t>
-            </a:r>
-            <a:endParaRPr lang="en-US" dirty="0" smtClean="0"/>
+              <a:t>Stefan Graw, PhD</a:t>
+            </a:r>
           </a:p>
         </p:txBody>
       </p:sp>
@@ -3512,6 +3600,186 @@
 </file>
 
 <file path=ppt/slides/slide10.xml><?xml version="1.0" encoding="utf-8"?>
+<p:sld xmlns:a="http://schemas.openxmlformats.org/drawingml/2006/main" xmlns:r="http://schemas.openxmlformats.org/officeDocument/2006/relationships" xmlns:p="http://schemas.openxmlformats.org/presentationml/2006/main">
+  <p:cSld>
+    <p:spTree>
+      <p:nvGrpSpPr>
+        <p:cNvPr id="1" name=""/>
+        <p:cNvGrpSpPr/>
+        <p:nvPr/>
+      </p:nvGrpSpPr>
+      <p:grpSpPr>
+        <a:xfrm>
+          <a:off x="0" y="0"/>
+          <a:ext cx="0" cy="0"/>
+          <a:chOff x="0" y="0"/>
+          <a:chExt cx="0" cy="0"/>
+        </a:xfrm>
+      </p:grpSpPr>
+      <p:sp>
+        <p:nvSpPr>
+          <p:cNvPr id="2" name="Title 1"/>
+          <p:cNvSpPr>
+            <a:spLocks noGrp="1"/>
+          </p:cNvSpPr>
+          <p:nvPr>
+            <p:ph type="title"/>
+          </p:nvPr>
+        </p:nvSpPr>
+        <p:spPr/>
+        <p:txBody>
+          <a:bodyPr/>
+          <a:lstStyle/>
+          <a:p>
+            <a:r>
+              <a:rPr lang="en-US" dirty="0" smtClean="0"/>
+              <a:t>AUC &amp; power</a:t>
+            </a:r>
+            <a:endParaRPr lang="en-US" dirty="0"/>
+          </a:p>
+        </p:txBody>
+      </p:sp>
+      <p:pic>
+        <p:nvPicPr>
+          <p:cNvPr id="1026" name="Picture 2" descr="Left: Definitions of terminologies in a statistical test. Right: An illustration of power and significance level in a simple statistical test, where the left and right bell curves are the densities of the test statistics under the null hypothesis and the alternative hypothesis, respectively.[14]"/>
+          <p:cNvPicPr>
+            <a:picLocks noGrp="1" noChangeAspect="1" noChangeArrowheads="1"/>
+          </p:cNvPicPr>
+          <p:nvPr>
+            <p:ph idx="1"/>
+          </p:nvPr>
+        </p:nvPicPr>
+        <p:blipFill>
+          <a:blip r:embed="rId3">
+            <a:extLst>
+              <a:ext uri="{28A0092B-C50C-407E-A947-70E740481C1C}">
+                <a14:useLocalDpi xmlns:a14="http://schemas.microsoft.com/office/drawing/2010/main" val="0"/>
+              </a:ext>
+            </a:extLst>
+          </a:blip>
+          <a:srcRect/>
+          <a:stretch>
+            <a:fillRect/>
+          </a:stretch>
+        </p:blipFill>
+        <p:spPr bwMode="auto">
+          <a:xfrm>
+            <a:off x="4923785" y="2186624"/>
+            <a:ext cx="7221629" cy="3236989"/>
+          </a:xfrm>
+          <a:prstGeom prst="rect">
+            <a:avLst/>
+          </a:prstGeom>
+          <a:noFill/>
+          <a:extLst>
+            <a:ext uri="{909E8E84-426E-40DD-AFC4-6F175D3DCCD1}">
+              <a14:hiddenFill xmlns:a14="http://schemas.microsoft.com/office/drawing/2010/main">
+                <a:solidFill>
+                  <a:srgbClr val="FFFFFF"/>
+                </a:solidFill>
+              </a14:hiddenFill>
+            </a:ext>
+          </a:extLst>
+        </p:spPr>
+      </p:pic>
+      <p:sp>
+        <p:nvSpPr>
+          <p:cNvPr id="5" name="TextBox 4"/>
+          <p:cNvSpPr txBox="1"/>
+          <p:nvPr/>
+        </p:nvSpPr>
+        <p:spPr>
+          <a:xfrm>
+            <a:off x="4892475" y="6457890"/>
+            <a:ext cx="7407797" cy="400110"/>
+          </a:xfrm>
+          <a:prstGeom prst="rect">
+            <a:avLst/>
+          </a:prstGeom>
+          <a:noFill/>
+        </p:spPr>
+        <p:txBody>
+          <a:bodyPr wrap="none" rtlCol="0">
+            <a:spAutoFit/>
+          </a:bodyPr>
+          <a:lstStyle/>
+          <a:p>
+            <a:r>
+              <a:rPr lang="en-US" sz="1000" dirty="0" smtClean="0">
+                <a:hlinkClick r:id="rId4"/>
+              </a:rPr>
+              <a:t>https://glassboxmedicine.com/2019/02/23/measuring-performance-auc-auroc/</a:t>
+            </a:r>
+            <a:endParaRPr lang="en-US" sz="1000" dirty="0" smtClean="0">
+              <a:hlinkClick r:id="rId5"/>
+            </a:endParaRPr>
+          </a:p>
+          <a:p>
+            <a:r>
+              <a:rPr lang="en-US" sz="1000" dirty="0" smtClean="0">
+                <a:hlinkClick r:id="rId5"/>
+              </a:rPr>
+              <a:t>https://www.researchgate.net/figure/Left-Definitions-of-terminologies-in-a-statistical-test-Right-An-illustration-of-power_fig3_316927316</a:t>
+            </a:r>
+            <a:endParaRPr lang="en-US" sz="1000" dirty="0"/>
+          </a:p>
+        </p:txBody>
+      </p:sp>
+      <p:pic>
+        <p:nvPicPr>
+          <p:cNvPr id="1028" name="Picture 4" descr="https://glassboxmedicine.files.wordpress.com/2019/02/roc-curve-v2.png?w=576"/>
+          <p:cNvPicPr>
+            <a:picLocks noChangeAspect="1" noChangeArrowheads="1"/>
+          </p:cNvPicPr>
+          <p:nvPr/>
+        </p:nvPicPr>
+        <p:blipFill>
+          <a:blip r:embed="rId6">
+            <a:extLst>
+              <a:ext uri="{28A0092B-C50C-407E-A947-70E740481C1C}">
+                <a14:useLocalDpi xmlns:a14="http://schemas.microsoft.com/office/drawing/2010/main" val="0"/>
+              </a:ext>
+            </a:extLst>
+          </a:blip>
+          <a:srcRect/>
+          <a:stretch>
+            <a:fillRect/>
+          </a:stretch>
+        </p:blipFill>
+        <p:spPr bwMode="auto">
+          <a:xfrm>
+            <a:off x="0" y="1785948"/>
+            <a:ext cx="4892475" cy="3669357"/>
+          </a:xfrm>
+          <a:prstGeom prst="rect">
+            <a:avLst/>
+          </a:prstGeom>
+          <a:noFill/>
+          <a:extLst>
+            <a:ext uri="{909E8E84-426E-40DD-AFC4-6F175D3DCCD1}">
+              <a14:hiddenFill xmlns:a14="http://schemas.microsoft.com/office/drawing/2010/main">
+                <a:solidFill>
+                  <a:srgbClr val="FFFFFF"/>
+                </a:solidFill>
+              </a14:hiddenFill>
+            </a:ext>
+          </a:extLst>
+        </p:spPr>
+      </p:pic>
+    </p:spTree>
+    <p:extLst>
+      <p:ext uri="{BB962C8B-B14F-4D97-AF65-F5344CB8AC3E}">
+        <p14:creationId xmlns:p14="http://schemas.microsoft.com/office/powerpoint/2010/main" val="4276133750"/>
+      </p:ext>
+    </p:extLst>
+  </p:cSld>
+  <p:clrMapOvr>
+    <a:masterClrMapping/>
+  </p:clrMapOvr>
+</p:sld>
+</file>
+
+<file path=ppt/slides/slide11.xml><?xml version="1.0" encoding="utf-8"?>
 <p:sld xmlns:a="http://schemas.openxmlformats.org/drawingml/2006/main" xmlns:r="http://schemas.openxmlformats.org/officeDocument/2006/relationships" xmlns:p="http://schemas.openxmlformats.org/presentationml/2006/main">
   <p:cSld>
     <p:spTree>
@@ -4186,6 +4454,559 @@
           <a:chExt cx="0" cy="0"/>
         </a:xfrm>
       </p:grpSpPr>
+      <mc:AlternateContent xmlns:mc="http://schemas.openxmlformats.org/markup-compatibility/2006">
+        <mc:Choice xmlns:a14="http://schemas.microsoft.com/office/drawing/2010/main" Requires="a14">
+          <p:sp>
+            <p:nvSpPr>
+              <p:cNvPr id="3" name="Content Placeholder 2"/>
+              <p:cNvSpPr>
+                <a:spLocks noGrp="1"/>
+              </p:cNvSpPr>
+              <p:nvPr>
+                <p:ph idx="1"/>
+              </p:nvPr>
+            </p:nvSpPr>
+            <p:spPr>
+              <a:xfrm>
+                <a:off x="838200" y="757645"/>
+                <a:ext cx="10515600" cy="5419317"/>
+              </a:xfrm>
+            </p:spPr>
+            <p:txBody>
+              <a:bodyPr>
+                <a:normAutofit fontScale="92500" lnSpcReduction="20000"/>
+              </a:bodyPr>
+              <a:lstStyle/>
+              <a:p>
+                <a:r>
+                  <a:rPr lang="en-US" dirty="0" smtClean="0"/>
+                  <a:t>Median: </a:t>
+                </a:r>
+                <a14:m>
+                  <m:oMath xmlns:m="http://schemas.openxmlformats.org/officeDocument/2006/math">
+                    <m:f>
+                      <m:fPr>
+                        <m:ctrlPr>
+                          <a:rPr lang="en-US" i="1">
+                            <a:latin typeface="Cambria Math" panose="02040503050406030204" pitchFamily="18" charset="0"/>
+                          </a:rPr>
+                        </m:ctrlPr>
+                      </m:fPr>
+                      <m:num>
+                        <m:r>
+                          <a:rPr lang="en-US" i="1">
+                            <a:latin typeface="Cambria Math" panose="02040503050406030204" pitchFamily="18" charset="0"/>
+                          </a:rPr>
+                          <m:t>𝐼𝑛𝑡𝑒𝑛𝑠𝑖𝑡𝑦</m:t>
+                        </m:r>
+                      </m:num>
+                      <m:den>
+                        <m:r>
+                          <a:rPr lang="en-US" i="1">
+                            <a:latin typeface="Cambria Math" panose="02040503050406030204" pitchFamily="18" charset="0"/>
+                          </a:rPr>
+                          <m:t>𝑠𝑎𝑚𝑝𝑙𝑒𝑀𝑒𝑑𝑖𝑎𝑛</m:t>
+                        </m:r>
+                        <m:r>
+                          <m:rPr>
+                            <m:nor/>
+                          </m:rPr>
+                          <a:rPr lang="en-US" dirty="0"/>
+                          <m:t> </m:t>
+                        </m:r>
+                      </m:den>
+                    </m:f>
+                    <m:r>
+                      <a:rPr lang="en-US" i="1">
+                        <a:latin typeface="Cambria Math" panose="02040503050406030204" pitchFamily="18" charset="0"/>
+                      </a:rPr>
+                      <m:t>∗</m:t>
+                    </m:r>
+                    <m:r>
+                      <a:rPr lang="en-US" i="1">
+                        <a:latin typeface="Cambria Math" panose="02040503050406030204" pitchFamily="18" charset="0"/>
+                      </a:rPr>
+                      <m:t>𝑚𝑒𝑎𝑛</m:t>
+                    </m:r>
+                    <m:r>
+                      <a:rPr lang="en-US" i="1">
+                        <a:latin typeface="Cambria Math" panose="02040503050406030204" pitchFamily="18" charset="0"/>
+                      </a:rPr>
+                      <m:t>(</m:t>
+                    </m:r>
+                    <m:r>
+                      <a:rPr lang="en-US" i="1">
+                        <a:latin typeface="Cambria Math" panose="02040503050406030204" pitchFamily="18" charset="0"/>
+                      </a:rPr>
+                      <m:t>𝑠𝑎𝑚𝑝𝑙𝑒𝑀𝑒𝑑𝑖𝑎𝑛</m:t>
+                    </m:r>
+                    <m:r>
+                      <a:rPr lang="en-US" i="1">
+                        <a:latin typeface="Cambria Math" panose="02040503050406030204" pitchFamily="18" charset="0"/>
+                      </a:rPr>
+                      <m:t>)</m:t>
+                    </m:r>
+                  </m:oMath>
+                </a14:m>
+                <a:endParaRPr lang="en-US" dirty="0"/>
+              </a:p>
+              <a:p>
+                <a:r>
+                  <a:rPr lang="en-US" dirty="0" smtClean="0"/>
+                  <a:t>Mean: </a:t>
+                </a:r>
+                <a14:m>
+                  <m:oMath xmlns:m="http://schemas.openxmlformats.org/officeDocument/2006/math">
+                    <m:f>
+                      <m:fPr>
+                        <m:ctrlPr>
+                          <a:rPr lang="en-US" i="1">
+                            <a:latin typeface="Cambria Math" panose="02040503050406030204" pitchFamily="18" charset="0"/>
+                          </a:rPr>
+                        </m:ctrlPr>
+                      </m:fPr>
+                      <m:num>
+                        <m:r>
+                          <a:rPr lang="en-US" i="1">
+                            <a:latin typeface="Cambria Math" panose="02040503050406030204" pitchFamily="18" charset="0"/>
+                          </a:rPr>
+                          <m:t>𝐼𝑛𝑡𝑒𝑛𝑠𝑖𝑡𝑦</m:t>
+                        </m:r>
+                      </m:num>
+                      <m:den>
+                        <m:r>
+                          <a:rPr lang="en-US" i="1">
+                            <a:latin typeface="Cambria Math" panose="02040503050406030204" pitchFamily="18" charset="0"/>
+                          </a:rPr>
+                          <m:t>𝑠𝑎𝑚𝑝𝑙𝑒</m:t>
+                        </m:r>
+                        <m:r>
+                          <a:rPr lang="en-US" b="0" i="1" smtClean="0">
+                            <a:latin typeface="Cambria Math" panose="02040503050406030204" pitchFamily="18" charset="0"/>
+                          </a:rPr>
+                          <m:t>𝑀𝑒𝑎𝑛</m:t>
+                        </m:r>
+                      </m:den>
+                    </m:f>
+                    <m:r>
+                      <a:rPr lang="en-US" i="1">
+                        <a:latin typeface="Cambria Math" panose="02040503050406030204" pitchFamily="18" charset="0"/>
+                      </a:rPr>
+                      <m:t>∗</m:t>
+                    </m:r>
+                    <m:r>
+                      <a:rPr lang="en-US" i="1">
+                        <a:latin typeface="Cambria Math" panose="02040503050406030204" pitchFamily="18" charset="0"/>
+                      </a:rPr>
+                      <m:t>𝑚𝑒𝑎𝑛</m:t>
+                    </m:r>
+                    <m:r>
+                      <a:rPr lang="en-US" i="1">
+                        <a:latin typeface="Cambria Math" panose="02040503050406030204" pitchFamily="18" charset="0"/>
+                      </a:rPr>
+                      <m:t>(</m:t>
+                    </m:r>
+                    <m:r>
+                      <a:rPr lang="en-US" i="1">
+                        <a:latin typeface="Cambria Math" panose="02040503050406030204" pitchFamily="18" charset="0"/>
+                      </a:rPr>
+                      <m:t>𝑠𝑎𝑚𝑝𝑙𝑒𝑀𝑒𝑎𝑛</m:t>
+                    </m:r>
+                    <m:r>
+                      <a:rPr lang="en-US" i="1">
+                        <a:latin typeface="Cambria Math" panose="02040503050406030204" pitchFamily="18" charset="0"/>
+                      </a:rPr>
+                      <m:t>)</m:t>
+                    </m:r>
+                  </m:oMath>
+                </a14:m>
+                <a:endParaRPr lang="en-US" dirty="0"/>
+              </a:p>
+              <a:p>
+                <a:r>
+                  <a:rPr lang="en-US" dirty="0" smtClean="0"/>
+                  <a:t>VSN:</a:t>
+                </a:r>
+              </a:p>
+              <a:p>
+                <a:pPr lvl="1"/>
+                <a:r>
+                  <a:rPr lang="en-US" dirty="0" smtClean="0"/>
+                  <a:t>Affine transformation to </a:t>
+                </a:r>
+                <a:r>
+                  <a:rPr lang="en-US" dirty="0"/>
+                  <a:t>calibrate systematic experimental </a:t>
+                </a:r>
+                <a:r>
+                  <a:rPr lang="en-US" dirty="0" smtClean="0"/>
+                  <a:t>factors</a:t>
+                </a:r>
+              </a:p>
+              <a:p>
+                <a:pPr lvl="1"/>
+                <a14:m>
+                  <m:oMath xmlns:m="http://schemas.openxmlformats.org/officeDocument/2006/math">
+                    <m:r>
+                      <a:rPr lang="en-US" b="0" i="1" smtClean="0">
+                        <a:latin typeface="Cambria Math" panose="02040503050406030204" pitchFamily="18" charset="0"/>
+                      </a:rPr>
+                      <m:t>𝑔𝑙𝑜</m:t>
+                    </m:r>
+                    <m:sSub>
+                      <m:sSubPr>
+                        <m:ctrlPr>
+                          <a:rPr lang="en-US" b="0" i="1" smtClean="0">
+                            <a:latin typeface="Cambria Math" panose="02040503050406030204" pitchFamily="18" charset="0"/>
+                          </a:rPr>
+                        </m:ctrlPr>
+                      </m:sSubPr>
+                      <m:e>
+                        <m:r>
+                          <a:rPr lang="en-US" b="0" i="1" smtClean="0">
+                            <a:latin typeface="Cambria Math" panose="02040503050406030204" pitchFamily="18" charset="0"/>
+                          </a:rPr>
+                          <m:t>𝑔</m:t>
+                        </m:r>
+                      </m:e>
+                      <m:sub>
+                        <m:r>
+                          <a:rPr lang="en-US" b="0" i="1" smtClean="0">
+                            <a:latin typeface="Cambria Math" panose="02040503050406030204" pitchFamily="18" charset="0"/>
+                          </a:rPr>
+                          <m:t>2</m:t>
+                        </m:r>
+                      </m:sub>
+                    </m:sSub>
+                  </m:oMath>
+                </a14:m>
+                <a:r>
+                  <a:rPr lang="en-US" dirty="0" smtClean="0"/>
+                  <a:t> transformation for </a:t>
+                </a:r>
+                <a:r>
+                  <a:rPr lang="en-US" dirty="0"/>
+                  <a:t>variance </a:t>
+                </a:r>
+                <a:r>
+                  <a:rPr lang="en-US" dirty="0" smtClean="0"/>
+                  <a:t>stabilization</a:t>
+                </a:r>
+              </a:p>
+              <a:p>
+                <a:r>
+                  <a:rPr lang="en-US" dirty="0"/>
+                  <a:t>Quantile: </a:t>
+                </a:r>
+                <a:r>
+                  <a:rPr lang="en-US" dirty="0" smtClean="0"/>
+                  <a:t>make distributions </a:t>
+                </a:r>
+                <a:r>
+                  <a:rPr lang="en-US" dirty="0"/>
+                  <a:t>identical in statistical </a:t>
+                </a:r>
+                <a:r>
+                  <a:rPr lang="en-US" dirty="0" smtClean="0"/>
+                  <a:t>properties</a:t>
+                </a:r>
+              </a:p>
+              <a:p>
+                <a:r>
+                  <a:rPr lang="en-US" dirty="0"/>
+                  <a:t>Cyclic </a:t>
+                </a:r>
+                <a:r>
+                  <a:rPr lang="en-US" dirty="0" smtClean="0"/>
+                  <a:t>Loess: </a:t>
+                </a:r>
+              </a:p>
+              <a:p>
+                <a:pPr lvl="1"/>
+                <a:r>
+                  <a:rPr lang="en-US" dirty="0" smtClean="0"/>
+                  <a:t>Cyclically </a:t>
+                </a:r>
+                <a:r>
+                  <a:rPr lang="en-US" dirty="0"/>
+                  <a:t>applying loess </a:t>
+                </a:r>
+                <a:r>
+                  <a:rPr lang="en-US" dirty="0" smtClean="0"/>
+                  <a:t>normalization</a:t>
+                </a:r>
+              </a:p>
+              <a:p>
+                <a:pPr lvl="1"/>
+                <a:r>
+                  <a:rPr lang="en-US" dirty="0" smtClean="0"/>
+                  <a:t>Similar </a:t>
+                </a:r>
+                <a:r>
+                  <a:rPr lang="en-US" dirty="0"/>
+                  <a:t>effect and intention to quantile </a:t>
+                </a:r>
+                <a:r>
+                  <a:rPr lang="en-US" dirty="0" smtClean="0"/>
+                  <a:t>normalization</a:t>
+                </a:r>
+              </a:p>
+              <a:p>
+                <a:pPr lvl="1"/>
+                <a:r>
+                  <a:rPr lang="en-US" dirty="0"/>
+                  <a:t> </a:t>
+                </a:r>
+                <a:r>
+                  <a:rPr lang="en-US" dirty="0" smtClean="0"/>
+                  <a:t>Some advantages (e.g. incorporating probe weights)</a:t>
+                </a:r>
+              </a:p>
+              <a:p>
+                <a:r>
+                  <a:rPr lang="en-US" dirty="0" smtClean="0"/>
+                  <a:t>RLR: </a:t>
+                </a:r>
+                <a:r>
+                  <a:rPr lang="en-US" dirty="0"/>
+                  <a:t>Global linear regression </a:t>
+                </a:r>
+                <a:r>
+                  <a:rPr lang="en-US" dirty="0" smtClean="0"/>
+                  <a:t>normalization</a:t>
+                </a:r>
+                <a:r>
+                  <a:rPr lang="en-US" dirty="0"/>
+                  <a:t> </a:t>
+                </a:r>
+                <a:r>
+                  <a:rPr lang="en-US" dirty="0" smtClean="0"/>
+                  <a:t>normalizes </a:t>
+                </a:r>
+                <a:r>
+                  <a:rPr lang="en-US" dirty="0"/>
+                  <a:t>by robust linear regression </a:t>
+                </a:r>
+                <a:r>
+                  <a:rPr lang="en-US" dirty="0" smtClean="0"/>
+                  <a:t> </a:t>
+                </a:r>
+              </a:p>
+              <a:p>
+                <a:r>
+                  <a:rPr lang="en-US" dirty="0" smtClean="0"/>
+                  <a:t>Global Intensity: </a:t>
+                </a:r>
+              </a:p>
+              <a:p>
+                <a:pPr lvl="1"/>
+                <a14:m>
+                  <m:oMath xmlns:m="http://schemas.openxmlformats.org/officeDocument/2006/math">
+                    <m:func>
+                      <m:funcPr>
+                        <m:ctrlPr>
+                          <a:rPr lang="en-US" b="0" i="1" smtClean="0">
+                            <a:latin typeface="Cambria Math" panose="02040503050406030204" pitchFamily="18" charset="0"/>
+                          </a:rPr>
+                        </m:ctrlPr>
+                      </m:funcPr>
+                      <m:fName>
+                        <m:sSub>
+                          <m:sSubPr>
+                            <m:ctrlPr>
+                              <a:rPr lang="en-US" b="0" i="1" smtClean="0">
+                                <a:latin typeface="Cambria Math" panose="02040503050406030204" pitchFamily="18" charset="0"/>
+                              </a:rPr>
+                            </m:ctrlPr>
+                          </m:sSubPr>
+                          <m:e>
+                            <m:r>
+                              <m:rPr>
+                                <m:sty m:val="p"/>
+                              </m:rPr>
+                              <a:rPr lang="en-US" b="0" i="0" smtClean="0">
+                                <a:latin typeface="Cambria Math" panose="02040503050406030204" pitchFamily="18" charset="0"/>
+                              </a:rPr>
+                              <m:t>log</m:t>
+                            </m:r>
+                          </m:e>
+                          <m:sub>
+                            <m:r>
+                              <a:rPr lang="en-US" b="0" i="1" smtClean="0">
+                                <a:latin typeface="Cambria Math" panose="02040503050406030204" pitchFamily="18" charset="0"/>
+                              </a:rPr>
+                              <m:t>2</m:t>
+                            </m:r>
+                          </m:sub>
+                        </m:sSub>
+                      </m:fName>
+                      <m:e>
+                        <m:r>
+                          <a:rPr lang="en-US" i="1">
+                            <a:latin typeface="Cambria Math" panose="02040503050406030204" pitchFamily="18" charset="0"/>
+                          </a:rPr>
+                          <m:t>(</m:t>
+                        </m:r>
+                        <m:f>
+                          <m:fPr>
+                            <m:ctrlPr>
+                              <a:rPr lang="en-US" i="1">
+                                <a:latin typeface="Cambria Math" panose="02040503050406030204" pitchFamily="18" charset="0"/>
+                              </a:rPr>
+                            </m:ctrlPr>
+                          </m:fPr>
+                          <m:num>
+                            <m:r>
+                              <a:rPr lang="en-US" i="1">
+                                <a:latin typeface="Cambria Math" panose="02040503050406030204" pitchFamily="18" charset="0"/>
+                              </a:rPr>
+                              <m:t>𝑠𝑎𝑚𝑝𝑙𝑒</m:t>
+                            </m:r>
+                            <m:r>
+                              <a:rPr lang="en-US" i="1">
+                                <a:latin typeface="Cambria Math" panose="02040503050406030204" pitchFamily="18" charset="0"/>
+                              </a:rPr>
+                              <m:t>𝐼𝑛𝑡𝑒𝑛𝑠𝑖𝑡𝑦</m:t>
+                            </m:r>
+                          </m:num>
+                          <m:den>
+                            <m:r>
+                              <a:rPr lang="en-US" i="1">
+                                <a:latin typeface="Cambria Math" panose="02040503050406030204" pitchFamily="18" charset="0"/>
+                              </a:rPr>
+                              <m:t>𝑠𝑢𝑚</m:t>
+                            </m:r>
+                            <m:d>
+                              <m:dPr>
+                                <m:ctrlPr>
+                                  <a:rPr lang="en-US" i="1">
+                                    <a:latin typeface="Cambria Math" panose="02040503050406030204" pitchFamily="18" charset="0"/>
+                                  </a:rPr>
+                                </m:ctrlPr>
+                              </m:dPr>
+                              <m:e>
+                                <m:r>
+                                  <a:rPr lang="en-US" i="1">
+                                    <a:latin typeface="Cambria Math" panose="02040503050406030204" pitchFamily="18" charset="0"/>
+                                  </a:rPr>
+                                  <m:t>𝑠𝑎𝑚𝑝𝑙𝑒𝐼𝑛𝑡𝑒𝑛𝑠𝑖𝑡𝑦</m:t>
+                                </m:r>
+                              </m:e>
+                            </m:d>
+                          </m:den>
+                        </m:f>
+                        <m:r>
+                          <a:rPr lang="en-US" i="1">
+                            <a:latin typeface="Cambria Math" panose="02040503050406030204" pitchFamily="18" charset="0"/>
+                          </a:rPr>
+                          <m:t>∗</m:t>
+                        </m:r>
+                        <m:r>
+                          <a:rPr lang="en-US" i="1">
+                            <a:latin typeface="Cambria Math" panose="02040503050406030204" pitchFamily="18" charset="0"/>
+                          </a:rPr>
+                          <m:t>𝑚𝑒𝑑𝑖𝑎𝑛</m:t>
+                        </m:r>
+                        <m:d>
+                          <m:dPr>
+                            <m:ctrlPr>
+                              <a:rPr lang="en-US" i="1">
+                                <a:latin typeface="Cambria Math" panose="02040503050406030204" pitchFamily="18" charset="0"/>
+                              </a:rPr>
+                            </m:ctrlPr>
+                          </m:dPr>
+                          <m:e>
+                            <m:r>
+                              <a:rPr lang="en-US" i="1">
+                                <a:latin typeface="Cambria Math" panose="02040503050406030204" pitchFamily="18" charset="0"/>
+                              </a:rPr>
+                              <m:t>𝐼𝑛𝑡𝑒𝑛𝑠𝑖𝑡𝑦𝑆𝑢𝑚𝑠𝐵𝑦𝑆𝑎𝑚𝑝𝑙𝑒</m:t>
+                            </m:r>
+                          </m:e>
+                        </m:d>
+                        <m:r>
+                          <a:rPr lang="en-US" b="0" i="1" smtClean="0">
+                            <a:latin typeface="Cambria Math" panose="02040503050406030204" pitchFamily="18" charset="0"/>
+                          </a:rPr>
+                          <m:t>)</m:t>
+                        </m:r>
+                      </m:e>
+                    </m:func>
+                  </m:oMath>
+                </a14:m>
+                <a:endParaRPr lang="en-US" dirty="0" smtClean="0"/>
+              </a:p>
+            </p:txBody>
+          </p:sp>
+        </mc:Choice>
+        <mc:Fallback>
+          <p:sp>
+            <p:nvSpPr>
+              <p:cNvPr id="3" name="Content Placeholder 2"/>
+              <p:cNvSpPr>
+                <a:spLocks noGrp="1" noRot="1" noChangeAspect="1" noMove="1" noResize="1" noEditPoints="1" noAdjustHandles="1" noChangeArrowheads="1" noChangeShapeType="1" noTextEdit="1"/>
+              </p:cNvSpPr>
+              <p:nvPr>
+                <p:ph idx="1"/>
+              </p:nvPr>
+            </p:nvSpPr>
+            <p:spPr>
+              <a:xfrm>
+                <a:off x="838200" y="757645"/>
+                <a:ext cx="10515600" cy="5419317"/>
+              </a:xfrm>
+              <a:blipFill>
+                <a:blip r:embed="rId3"/>
+                <a:stretch>
+                  <a:fillRect l="-928" t="-1687"/>
+                </a:stretch>
+              </a:blipFill>
+            </p:spPr>
+            <p:txBody>
+              <a:bodyPr/>
+              <a:lstStyle/>
+              <a:p>
+                <a:r>
+                  <a:rPr lang="en-US">
+                    <a:noFill/>
+                  </a:rPr>
+                  <a:t> </a:t>
+                </a:r>
+              </a:p>
+            </p:txBody>
+          </p:sp>
+        </mc:Fallback>
+      </mc:AlternateContent>
+    </p:spTree>
+    <p:extLst>
+      <p:ext uri="{BB962C8B-B14F-4D97-AF65-F5344CB8AC3E}">
+        <p14:creationId xmlns:p14="http://schemas.microsoft.com/office/powerpoint/2010/main" val="265547978"/>
+      </p:ext>
+    </p:extLst>
+  </p:cSld>
+  <p:clrMapOvr>
+    <a:masterClrMapping/>
+  </p:clrMapOvr>
+</p:sld>
+</file>
+
+<file path=ppt/slides/slide7.xml><?xml version="1.0" encoding="utf-8"?>
+<p:sld xmlns:a="http://schemas.openxmlformats.org/drawingml/2006/main" xmlns:r="http://schemas.openxmlformats.org/officeDocument/2006/relationships" xmlns:p="http://schemas.openxmlformats.org/presentationml/2006/main">
+  <p:cSld>
+    <p:spTree>
+      <p:nvGrpSpPr>
+        <p:cNvPr id="1" name=""/>
+        <p:cNvGrpSpPr/>
+        <p:nvPr/>
+      </p:nvGrpSpPr>
+      <p:grpSpPr>
+        <a:xfrm>
+          <a:off x="0" y="0"/>
+          <a:ext cx="0" cy="0"/>
+          <a:chOff x="0" y="0"/>
+          <a:chExt cx="0" cy="0"/>
+        </a:xfrm>
+      </p:grpSpPr>
       <p:sp>
         <p:nvSpPr>
           <p:cNvPr id="2" name="Title 1"/>
@@ -4319,7 +5140,7 @@
 </p:sld>
 </file>
 
-<file path=ppt/slides/slide7.xml><?xml version="1.0" encoding="utf-8"?>
+<file path=ppt/slides/slide8.xml><?xml version="1.0" encoding="utf-8"?>
 <p:sld xmlns:a="http://schemas.openxmlformats.org/drawingml/2006/main" xmlns:r="http://schemas.openxmlformats.org/officeDocument/2006/relationships" xmlns:p="http://schemas.openxmlformats.org/presentationml/2006/main">
   <p:cSld>
     <p:spTree>
@@ -4777,179 +5598,6 @@
 </p:sld>
 </file>
 
-<file path=ppt/slides/slide8.xml><?xml version="1.0" encoding="utf-8"?>
-<p:sld xmlns:a="http://schemas.openxmlformats.org/drawingml/2006/main" xmlns:r="http://schemas.openxmlformats.org/officeDocument/2006/relationships" xmlns:p="http://schemas.openxmlformats.org/presentationml/2006/main">
-  <p:cSld>
-    <p:spTree>
-      <p:nvGrpSpPr>
-        <p:cNvPr id="1" name=""/>
-        <p:cNvGrpSpPr/>
-        <p:nvPr/>
-      </p:nvGrpSpPr>
-      <p:grpSpPr>
-        <a:xfrm>
-          <a:off x="0" y="0"/>
-          <a:ext cx="0" cy="0"/>
-          <a:chOff x="0" y="0"/>
-          <a:chExt cx="0" cy="0"/>
-        </a:xfrm>
-      </p:grpSpPr>
-      <p:sp>
-        <p:nvSpPr>
-          <p:cNvPr id="2" name="Title 1"/>
-          <p:cNvSpPr>
-            <a:spLocks noGrp="1"/>
-          </p:cNvSpPr>
-          <p:nvPr>
-            <p:ph type="title"/>
-          </p:nvPr>
-        </p:nvSpPr>
-        <p:spPr/>
-        <p:txBody>
-          <a:bodyPr/>
-          <a:lstStyle/>
-          <a:p>
-            <a:r>
-              <a:rPr lang="en-US" dirty="0" err="1" smtClean="0"/>
-              <a:t>DAtest</a:t>
-            </a:r>
-            <a:r>
-              <a:rPr lang="en-US" dirty="0" smtClean="0"/>
-              <a:t> </a:t>
-            </a:r>
-            <a:r>
-              <a:rPr lang="en-US" dirty="0"/>
-              <a:t>&amp; </a:t>
-            </a:r>
-            <a:r>
-              <a:rPr lang="en-US" dirty="0" err="1" smtClean="0"/>
-              <a:t>powerDA</a:t>
-            </a:r>
-            <a:r>
-              <a:rPr lang="en-US" dirty="0" smtClean="0"/>
-              <a:t> [4]</a:t>
-            </a:r>
-            <a:endParaRPr lang="en-US" dirty="0"/>
-          </a:p>
-        </p:txBody>
-      </p:sp>
-      <p:sp>
-        <p:nvSpPr>
-          <p:cNvPr id="3" name="Content Placeholder 2"/>
-          <p:cNvSpPr>
-            <a:spLocks noGrp="1"/>
-          </p:cNvSpPr>
-          <p:nvPr>
-            <p:ph idx="1"/>
-          </p:nvPr>
-        </p:nvSpPr>
-        <p:spPr/>
-        <p:txBody>
-          <a:bodyPr/>
-          <a:lstStyle/>
-          <a:p>
-            <a:r>
-              <a:rPr lang="en-US" dirty="0" smtClean="0"/>
-              <a:t>Comparing </a:t>
-            </a:r>
-            <a:r>
-              <a:rPr lang="en-US" dirty="0"/>
-              <a:t>different differential abundance </a:t>
-            </a:r>
-            <a:r>
-              <a:rPr lang="en-US" dirty="0" smtClean="0"/>
-              <a:t>methods</a:t>
-            </a:r>
-          </a:p>
-          <a:p>
-            <a:pPr lvl="1"/>
-            <a:r>
-              <a:rPr lang="en-US" dirty="0" smtClean="0"/>
-              <a:t>Microbial marker-gene analysis</a:t>
-            </a:r>
-          </a:p>
-          <a:p>
-            <a:pPr lvl="1"/>
-            <a:r>
-              <a:rPr lang="en-US" dirty="0" smtClean="0"/>
-              <a:t>RNA-</a:t>
-            </a:r>
-            <a:r>
-              <a:rPr lang="en-US" dirty="0" err="1" smtClean="0"/>
-              <a:t>seq</a:t>
-            </a:r>
-            <a:r>
-              <a:rPr lang="en-US" dirty="0" smtClean="0"/>
-              <a:t> analysis</a:t>
-            </a:r>
-          </a:p>
-          <a:p>
-            <a:pPr lvl="1"/>
-            <a:r>
-              <a:rPr lang="en-US" dirty="0" smtClean="0"/>
-              <a:t>Protein/metabolite abundance analysis</a:t>
-            </a:r>
-          </a:p>
-          <a:p>
-            <a:r>
-              <a:rPr lang="en-US" dirty="0" smtClean="0"/>
-              <a:t>Method:</a:t>
-            </a:r>
-          </a:p>
-          <a:p>
-            <a:pPr lvl="1"/>
-            <a:r>
-              <a:rPr lang="en-US" dirty="0" smtClean="0"/>
-              <a:t>Shuffle predictor variable (e.g. case/control)</a:t>
-            </a:r>
-          </a:p>
-          <a:p>
-            <a:pPr lvl="1"/>
-            <a:r>
-              <a:rPr lang="en-US" dirty="0" smtClean="0"/>
-              <a:t>Spike data for randomly chosen features</a:t>
-            </a:r>
-          </a:p>
-          <a:p>
-            <a:pPr lvl="1"/>
-            <a:r>
-              <a:rPr lang="en-US" dirty="0" smtClean="0"/>
-              <a:t>Apply tests and evaluate</a:t>
-            </a:r>
-          </a:p>
-          <a:p>
-            <a:pPr lvl="2"/>
-            <a:r>
-              <a:rPr lang="en-US" dirty="0" smtClean="0"/>
-              <a:t>Whether test finds spike-ins</a:t>
-            </a:r>
-          </a:p>
-          <a:p>
-            <a:pPr lvl="2"/>
-            <a:r>
-              <a:rPr lang="en-US" dirty="0" smtClean="0"/>
-              <a:t>Whether FDR is controlled</a:t>
-            </a:r>
-          </a:p>
-          <a:p>
-            <a:pPr lvl="1"/>
-            <a:endParaRPr lang="en-US" dirty="0"/>
-          </a:p>
-        </p:txBody>
-      </p:sp>
-    </p:spTree>
-    <p:extLst>
-      <p:ext uri="{BB962C8B-B14F-4D97-AF65-F5344CB8AC3E}">
-        <p14:creationId xmlns:p14="http://schemas.microsoft.com/office/powerpoint/2010/main" val="2449361005"/>
-      </p:ext>
-    </p:extLst>
-  </p:cSld>
-  <p:clrMapOvr>
-    <a:masterClrMapping/>
-  </p:clrMapOvr>
-</p:sld>
-</file>
-
 <file path=ppt/slides/slide9.xml><?xml version="1.0" encoding="utf-8"?>
 <p:sld xmlns:a="http://schemas.openxmlformats.org/drawingml/2006/main" xmlns:r="http://schemas.openxmlformats.org/officeDocument/2006/relationships" xmlns:p="http://schemas.openxmlformats.org/presentationml/2006/main">
   <p:cSld>
@@ -4983,144 +5631,137 @@
           <a:lstStyle/>
           <a:p>
             <a:r>
+              <a:rPr lang="en-US" dirty="0" err="1" smtClean="0"/>
+              <a:t>DAtest</a:t>
+            </a:r>
+            <a:r>
               <a:rPr lang="en-US" dirty="0" smtClean="0"/>
-              <a:t>AUC &amp; power</a:t>
+              <a:t> </a:t>
+            </a:r>
+            <a:r>
+              <a:rPr lang="en-US" dirty="0"/>
+              <a:t>&amp; </a:t>
+            </a:r>
+            <a:r>
+              <a:rPr lang="en-US" dirty="0" err="1" smtClean="0"/>
+              <a:t>powerDA</a:t>
+            </a:r>
+            <a:r>
+              <a:rPr lang="en-US" dirty="0" smtClean="0"/>
+              <a:t> [4]</a:t>
             </a:r>
             <a:endParaRPr lang="en-US" dirty="0"/>
           </a:p>
         </p:txBody>
       </p:sp>
-      <p:pic>
-        <p:nvPicPr>
-          <p:cNvPr id="1026" name="Picture 2" descr="Left: Definitions of terminologies in a statistical test. Right: An illustration of power and significance level in a simple statistical test, where the left and right bell curves are the densities of the test statistics under the null hypothesis and the alternative hypothesis, respectively.[14]"/>
-          <p:cNvPicPr>
-            <a:picLocks noGrp="1" noChangeAspect="1" noChangeArrowheads="1"/>
-          </p:cNvPicPr>
+      <p:sp>
+        <p:nvSpPr>
+          <p:cNvPr id="3" name="Content Placeholder 2"/>
+          <p:cNvSpPr>
+            <a:spLocks noGrp="1"/>
+          </p:cNvSpPr>
           <p:nvPr>
             <p:ph idx="1"/>
           </p:nvPr>
-        </p:nvPicPr>
-        <p:blipFill>
-          <a:blip r:embed="rId3">
-            <a:extLst>
-              <a:ext uri="{28A0092B-C50C-407E-A947-70E740481C1C}">
-                <a14:useLocalDpi xmlns:a14="http://schemas.microsoft.com/office/drawing/2010/main" val="0"/>
-              </a:ext>
-            </a:extLst>
-          </a:blip>
-          <a:srcRect/>
-          <a:stretch>
-            <a:fillRect/>
-          </a:stretch>
-        </p:blipFill>
-        <p:spPr bwMode="auto">
-          <a:xfrm>
-            <a:off x="4923785" y="2186624"/>
-            <a:ext cx="7221629" cy="3236989"/>
-          </a:xfrm>
-          <a:prstGeom prst="rect">
-            <a:avLst/>
-          </a:prstGeom>
-          <a:noFill/>
-          <a:extLst>
-            <a:ext uri="{909E8E84-426E-40DD-AFC4-6F175D3DCCD1}">
-              <a14:hiddenFill xmlns:a14="http://schemas.microsoft.com/office/drawing/2010/main">
-                <a:solidFill>
-                  <a:srgbClr val="FFFFFF"/>
-                </a:solidFill>
-              </a14:hiddenFill>
-            </a:ext>
-          </a:extLst>
-        </p:spPr>
-      </p:pic>
-      <p:sp>
-        <p:nvSpPr>
-          <p:cNvPr id="5" name="TextBox 4"/>
-          <p:cNvSpPr txBox="1"/>
-          <p:nvPr/>
-        </p:nvSpPr>
-        <p:spPr>
-          <a:xfrm>
-            <a:off x="4892475" y="6457890"/>
-            <a:ext cx="7407797" cy="400110"/>
-          </a:xfrm>
-          <a:prstGeom prst="rect">
-            <a:avLst/>
-          </a:prstGeom>
-          <a:noFill/>
-        </p:spPr>
-        <p:txBody>
-          <a:bodyPr wrap="none" rtlCol="0">
-            <a:spAutoFit/>
-          </a:bodyPr>
-          <a:lstStyle/>
-          <a:p>
-            <a:r>
-              <a:rPr lang="en-US" sz="1000" dirty="0" smtClean="0">
-                <a:hlinkClick r:id="rId4"/>
-              </a:rPr>
-              <a:t>https://glassboxmedicine.com/2019/02/23/measuring-performance-auc-auroc/</a:t>
-            </a:r>
-            <a:endParaRPr lang="en-US" sz="1000" dirty="0" smtClean="0">
-              <a:hlinkClick r:id="rId5"/>
-            </a:endParaRPr>
-          </a:p>
-          <a:p>
-            <a:r>
-              <a:rPr lang="en-US" sz="1000" dirty="0" smtClean="0">
-                <a:hlinkClick r:id="rId5"/>
-              </a:rPr>
-              <a:t>https://www.researchgate.net/figure/Left-Definitions-of-terminologies-in-a-statistical-test-Right-An-illustration-of-power_fig3_316927316</a:t>
-            </a:r>
-            <a:endParaRPr lang="en-US" sz="1000" dirty="0"/>
-          </a:p>
-        </p:txBody>
-      </p:sp>
-      <p:pic>
-        <p:nvPicPr>
-          <p:cNvPr id="1028" name="Picture 4" descr="https://glassboxmedicine.files.wordpress.com/2019/02/roc-curve-v2.png?w=576"/>
-          <p:cNvPicPr>
-            <a:picLocks noChangeAspect="1" noChangeArrowheads="1"/>
-          </p:cNvPicPr>
-          <p:nvPr/>
-        </p:nvPicPr>
-        <p:blipFill>
-          <a:blip r:embed="rId6">
-            <a:extLst>
-              <a:ext uri="{28A0092B-C50C-407E-A947-70E740481C1C}">
-                <a14:useLocalDpi xmlns:a14="http://schemas.microsoft.com/office/drawing/2010/main" val="0"/>
-              </a:ext>
-            </a:extLst>
-          </a:blip>
-          <a:srcRect/>
-          <a:stretch>
-            <a:fillRect/>
-          </a:stretch>
-        </p:blipFill>
-        <p:spPr bwMode="auto">
-          <a:xfrm>
-            <a:off x="0" y="1785948"/>
-            <a:ext cx="4892475" cy="3669357"/>
-          </a:xfrm>
-          <a:prstGeom prst="rect">
-            <a:avLst/>
-          </a:prstGeom>
-          <a:noFill/>
-          <a:extLst>
-            <a:ext uri="{909E8E84-426E-40DD-AFC4-6F175D3DCCD1}">
-              <a14:hiddenFill xmlns:a14="http://schemas.microsoft.com/office/drawing/2010/main">
-                <a:solidFill>
-                  <a:srgbClr val="FFFFFF"/>
-                </a:solidFill>
-              </a14:hiddenFill>
-            </a:ext>
-          </a:extLst>
-        </p:spPr>
-      </p:pic>
+        </p:nvSpPr>
+        <p:spPr/>
+        <p:txBody>
+          <a:bodyPr/>
+          <a:lstStyle/>
+          <a:p>
+            <a:r>
+              <a:rPr lang="en-US" dirty="0" smtClean="0"/>
+              <a:t>Comparing </a:t>
+            </a:r>
+            <a:r>
+              <a:rPr lang="en-US" dirty="0"/>
+              <a:t>different differential abundance </a:t>
+            </a:r>
+            <a:r>
+              <a:rPr lang="en-US" dirty="0" smtClean="0"/>
+              <a:t>methods</a:t>
+            </a:r>
+          </a:p>
+          <a:p>
+            <a:pPr lvl="1"/>
+            <a:r>
+              <a:rPr lang="en-US" dirty="0" smtClean="0"/>
+              <a:t>Microbial marker-gene analysis</a:t>
+            </a:r>
+          </a:p>
+          <a:p>
+            <a:pPr lvl="1"/>
+            <a:r>
+              <a:rPr lang="en-US" dirty="0" smtClean="0"/>
+              <a:t>RNA-</a:t>
+            </a:r>
+            <a:r>
+              <a:rPr lang="en-US" dirty="0" err="1" smtClean="0"/>
+              <a:t>seq</a:t>
+            </a:r>
+            <a:r>
+              <a:rPr lang="en-US" dirty="0" smtClean="0"/>
+              <a:t> analysis</a:t>
+            </a:r>
+          </a:p>
+          <a:p>
+            <a:pPr lvl="1"/>
+            <a:r>
+              <a:rPr lang="en-US" dirty="0" smtClean="0"/>
+              <a:t>Protein/metabolite abundance analysis</a:t>
+            </a:r>
+          </a:p>
+          <a:p>
+            <a:r>
+              <a:rPr lang="en-US" dirty="0" smtClean="0"/>
+              <a:t>Method:</a:t>
+            </a:r>
+          </a:p>
+          <a:p>
+            <a:pPr lvl="1"/>
+            <a:r>
+              <a:rPr lang="en-US" dirty="0" smtClean="0"/>
+              <a:t>Shuffle predictor variable (e.g. case/control)</a:t>
+            </a:r>
+          </a:p>
+          <a:p>
+            <a:pPr lvl="1"/>
+            <a:r>
+              <a:rPr lang="en-US" dirty="0" smtClean="0"/>
+              <a:t>Spike data for randomly chosen features</a:t>
+            </a:r>
+          </a:p>
+          <a:p>
+            <a:pPr lvl="1"/>
+            <a:r>
+              <a:rPr lang="en-US" dirty="0" smtClean="0"/>
+              <a:t>Apply tests and evaluate</a:t>
+            </a:r>
+          </a:p>
+          <a:p>
+            <a:pPr lvl="2"/>
+            <a:r>
+              <a:rPr lang="en-US" dirty="0" smtClean="0"/>
+              <a:t>Whether test finds spike-ins</a:t>
+            </a:r>
+          </a:p>
+          <a:p>
+            <a:pPr lvl="2"/>
+            <a:r>
+              <a:rPr lang="en-US" dirty="0" smtClean="0"/>
+              <a:t>Whether FDR is controlled</a:t>
+            </a:r>
+          </a:p>
+          <a:p>
+            <a:pPr lvl="1"/>
+            <a:endParaRPr lang="en-US" dirty="0"/>
+          </a:p>
+        </p:txBody>
+      </p:sp>
     </p:spTree>
     <p:extLst>
       <p:ext uri="{BB962C8B-B14F-4D97-AF65-F5344CB8AC3E}">
-        <p14:creationId xmlns:p14="http://schemas.microsoft.com/office/powerpoint/2010/main" val="4276133750"/>
+        <p14:creationId xmlns:p14="http://schemas.microsoft.com/office/powerpoint/2010/main" val="2449361005"/>
       </p:ext>
     </p:extLst>
   </p:cSld>

</xml_diff>

<commit_message>
updated figures, reduced data
using top3 method now
only providing batch 3 and 4 now
</commit_message>
<xml_diff>
--- a/presentation/proteiNorm_IDeA.pptx
+++ b/presentation/proteiNorm_IDeA.pptx
@@ -5,20 +5,19 @@
     <p:sldMasterId id="2147483648" r:id="rId1"/>
   </p:sldMasterIdLst>
   <p:notesMasterIdLst>
-    <p:notesMasterId r:id="rId13"/>
+    <p:notesMasterId r:id="rId12"/>
   </p:notesMasterIdLst>
   <p:sldIdLst>
     <p:sldId id="256" r:id="rId2"/>
     <p:sldId id="257" r:id="rId3"/>
-    <p:sldId id="258" r:id="rId4"/>
-    <p:sldId id="259" r:id="rId5"/>
-    <p:sldId id="260" r:id="rId6"/>
-    <p:sldId id="266" r:id="rId7"/>
-    <p:sldId id="262" r:id="rId8"/>
-    <p:sldId id="263" r:id="rId9"/>
-    <p:sldId id="265" r:id="rId10"/>
-    <p:sldId id="264" r:id="rId11"/>
-    <p:sldId id="261" r:id="rId12"/>
+    <p:sldId id="259" r:id="rId4"/>
+    <p:sldId id="260" r:id="rId5"/>
+    <p:sldId id="266" r:id="rId6"/>
+    <p:sldId id="262" r:id="rId7"/>
+    <p:sldId id="263" r:id="rId8"/>
+    <p:sldId id="265" r:id="rId9"/>
+    <p:sldId id="264" r:id="rId10"/>
+    <p:sldId id="261" r:id="rId11"/>
   </p:sldIdLst>
   <p:sldSz cx="12192000" cy="6858000"/>
   <p:notesSz cx="6858000" cy="9144000"/>
@@ -207,7 +206,7 @@
           <a:p>
             <a:fld id="{703DA0AF-C6AC-472A-BEC4-E67B5BEE94F3}" type="datetimeFigureOut">
               <a:rPr lang="en-US" smtClean="0"/>
-              <a:t>1/29/2020</a:t>
+              <a:t>2/27/2020</a:t>
             </a:fld>
             <a:endParaRPr lang="en-US"/>
           </a:p>
@@ -548,7 +547,7 @@
           <a:p>
             <a:fld id="{2F515502-FC73-404A-8CA0-AECA6E3B8604}" type="slidenum">
               <a:rPr lang="en-US" smtClean="0"/>
-              <a:t>6</a:t>
+              <a:t>5</a:t>
             </a:fld>
             <a:endParaRPr lang="en-US"/>
           </a:p>
@@ -652,7 +651,7 @@
           <a:p>
             <a:fld id="{2F515502-FC73-404A-8CA0-AECA6E3B8604}" type="slidenum">
               <a:rPr lang="en-US" smtClean="0"/>
-              <a:t>10</a:t>
+              <a:t>9</a:t>
             </a:fld>
             <a:endParaRPr lang="en-US"/>
           </a:p>
@@ -802,7 +801,7 @@
           <a:p>
             <a:fld id="{EAA39E29-0CE1-4310-8C6D-D1D8E7935F0F}" type="datetimeFigureOut">
               <a:rPr lang="en-US" smtClean="0"/>
-              <a:t>1/29/2020</a:t>
+              <a:t>2/27/2020</a:t>
             </a:fld>
             <a:endParaRPr lang="en-US"/>
           </a:p>
@@ -972,7 +971,7 @@
           <a:p>
             <a:fld id="{EAA39E29-0CE1-4310-8C6D-D1D8E7935F0F}" type="datetimeFigureOut">
               <a:rPr lang="en-US" smtClean="0"/>
-              <a:t>1/29/2020</a:t>
+              <a:t>2/27/2020</a:t>
             </a:fld>
             <a:endParaRPr lang="en-US"/>
           </a:p>
@@ -1152,7 +1151,7 @@
           <a:p>
             <a:fld id="{EAA39E29-0CE1-4310-8C6D-D1D8E7935F0F}" type="datetimeFigureOut">
               <a:rPr lang="en-US" smtClean="0"/>
-              <a:t>1/29/2020</a:t>
+              <a:t>2/27/2020</a:t>
             </a:fld>
             <a:endParaRPr lang="en-US"/>
           </a:p>
@@ -1322,7 +1321,7 @@
           <a:p>
             <a:fld id="{EAA39E29-0CE1-4310-8C6D-D1D8E7935F0F}" type="datetimeFigureOut">
               <a:rPr lang="en-US" smtClean="0"/>
-              <a:t>1/29/2020</a:t>
+              <a:t>2/27/2020</a:t>
             </a:fld>
             <a:endParaRPr lang="en-US"/>
           </a:p>
@@ -1568,7 +1567,7 @@
           <a:p>
             <a:fld id="{EAA39E29-0CE1-4310-8C6D-D1D8E7935F0F}" type="datetimeFigureOut">
               <a:rPr lang="en-US" smtClean="0"/>
-              <a:t>1/29/2020</a:t>
+              <a:t>2/27/2020</a:t>
             </a:fld>
             <a:endParaRPr lang="en-US"/>
           </a:p>
@@ -1800,7 +1799,7 @@
           <a:p>
             <a:fld id="{EAA39E29-0CE1-4310-8C6D-D1D8E7935F0F}" type="datetimeFigureOut">
               <a:rPr lang="en-US" smtClean="0"/>
-              <a:t>1/29/2020</a:t>
+              <a:t>2/27/2020</a:t>
             </a:fld>
             <a:endParaRPr lang="en-US"/>
           </a:p>
@@ -2167,7 +2166,7 @@
           <a:p>
             <a:fld id="{EAA39E29-0CE1-4310-8C6D-D1D8E7935F0F}" type="datetimeFigureOut">
               <a:rPr lang="en-US" smtClean="0"/>
-              <a:t>1/29/2020</a:t>
+              <a:t>2/27/2020</a:t>
             </a:fld>
             <a:endParaRPr lang="en-US"/>
           </a:p>
@@ -2285,7 +2284,7 @@
           <a:p>
             <a:fld id="{EAA39E29-0CE1-4310-8C6D-D1D8E7935F0F}" type="datetimeFigureOut">
               <a:rPr lang="en-US" smtClean="0"/>
-              <a:t>1/29/2020</a:t>
+              <a:t>2/27/2020</a:t>
             </a:fld>
             <a:endParaRPr lang="en-US"/>
           </a:p>
@@ -2380,7 +2379,7 @@
           <a:p>
             <a:fld id="{EAA39E29-0CE1-4310-8C6D-D1D8E7935F0F}" type="datetimeFigureOut">
               <a:rPr lang="en-US" smtClean="0"/>
-              <a:t>1/29/2020</a:t>
+              <a:t>2/27/2020</a:t>
             </a:fld>
             <a:endParaRPr lang="en-US"/>
           </a:p>
@@ -2657,7 +2656,7 @@
           <a:p>
             <a:fld id="{EAA39E29-0CE1-4310-8C6D-D1D8E7935F0F}" type="datetimeFigureOut">
               <a:rPr lang="en-US" smtClean="0"/>
-              <a:t>1/29/2020</a:t>
+              <a:t>2/27/2020</a:t>
             </a:fld>
             <a:endParaRPr lang="en-US"/>
           </a:p>
@@ -2910,7 +2909,7 @@
           <a:p>
             <a:fld id="{EAA39E29-0CE1-4310-8C6D-D1D8E7935F0F}" type="datetimeFigureOut">
               <a:rPr lang="en-US" smtClean="0"/>
-              <a:t>1/29/2020</a:t>
+              <a:t>2/27/2020</a:t>
             </a:fld>
             <a:endParaRPr lang="en-US"/>
           </a:p>
@@ -3123,7 +3122,7 @@
           <a:p>
             <a:fld id="{EAA39E29-0CE1-4310-8C6D-D1D8E7935F0F}" type="datetimeFigureOut">
               <a:rPr lang="en-US" smtClean="0"/>
-              <a:t>1/29/2020</a:t>
+              <a:t>2/27/2020</a:t>
             </a:fld>
             <a:endParaRPr lang="en-US"/>
           </a:p>
@@ -3633,186 +3632,6 @@
           <a:p>
             <a:r>
               <a:rPr lang="en-US" dirty="0" smtClean="0"/>
-              <a:t>AUC &amp; power</a:t>
-            </a:r>
-            <a:endParaRPr lang="en-US" dirty="0"/>
-          </a:p>
-        </p:txBody>
-      </p:sp>
-      <p:pic>
-        <p:nvPicPr>
-          <p:cNvPr id="1026" name="Picture 2" descr="Left: Definitions of terminologies in a statistical test. Right: An illustration of power and significance level in a simple statistical test, where the left and right bell curves are the densities of the test statistics under the null hypothesis and the alternative hypothesis, respectively.[14]"/>
-          <p:cNvPicPr>
-            <a:picLocks noGrp="1" noChangeAspect="1" noChangeArrowheads="1"/>
-          </p:cNvPicPr>
-          <p:nvPr>
-            <p:ph idx="1"/>
-          </p:nvPr>
-        </p:nvPicPr>
-        <p:blipFill>
-          <a:blip r:embed="rId3">
-            <a:extLst>
-              <a:ext uri="{28A0092B-C50C-407E-A947-70E740481C1C}">
-                <a14:useLocalDpi xmlns:a14="http://schemas.microsoft.com/office/drawing/2010/main" val="0"/>
-              </a:ext>
-            </a:extLst>
-          </a:blip>
-          <a:srcRect/>
-          <a:stretch>
-            <a:fillRect/>
-          </a:stretch>
-        </p:blipFill>
-        <p:spPr bwMode="auto">
-          <a:xfrm>
-            <a:off x="4923785" y="2186624"/>
-            <a:ext cx="7221629" cy="3236989"/>
-          </a:xfrm>
-          <a:prstGeom prst="rect">
-            <a:avLst/>
-          </a:prstGeom>
-          <a:noFill/>
-          <a:extLst>
-            <a:ext uri="{909E8E84-426E-40DD-AFC4-6F175D3DCCD1}">
-              <a14:hiddenFill xmlns:a14="http://schemas.microsoft.com/office/drawing/2010/main">
-                <a:solidFill>
-                  <a:srgbClr val="FFFFFF"/>
-                </a:solidFill>
-              </a14:hiddenFill>
-            </a:ext>
-          </a:extLst>
-        </p:spPr>
-      </p:pic>
-      <p:sp>
-        <p:nvSpPr>
-          <p:cNvPr id="5" name="TextBox 4"/>
-          <p:cNvSpPr txBox="1"/>
-          <p:nvPr/>
-        </p:nvSpPr>
-        <p:spPr>
-          <a:xfrm>
-            <a:off x="4892475" y="6457890"/>
-            <a:ext cx="7407797" cy="400110"/>
-          </a:xfrm>
-          <a:prstGeom prst="rect">
-            <a:avLst/>
-          </a:prstGeom>
-          <a:noFill/>
-        </p:spPr>
-        <p:txBody>
-          <a:bodyPr wrap="none" rtlCol="0">
-            <a:spAutoFit/>
-          </a:bodyPr>
-          <a:lstStyle/>
-          <a:p>
-            <a:r>
-              <a:rPr lang="en-US" sz="1000" dirty="0" smtClean="0">
-                <a:hlinkClick r:id="rId4"/>
-              </a:rPr>
-              <a:t>https://glassboxmedicine.com/2019/02/23/measuring-performance-auc-auroc/</a:t>
-            </a:r>
-            <a:endParaRPr lang="en-US" sz="1000" dirty="0" smtClean="0">
-              <a:hlinkClick r:id="rId5"/>
-            </a:endParaRPr>
-          </a:p>
-          <a:p>
-            <a:r>
-              <a:rPr lang="en-US" sz="1000" dirty="0" smtClean="0">
-                <a:hlinkClick r:id="rId5"/>
-              </a:rPr>
-              <a:t>https://www.researchgate.net/figure/Left-Definitions-of-terminologies-in-a-statistical-test-Right-An-illustration-of-power_fig3_316927316</a:t>
-            </a:r>
-            <a:endParaRPr lang="en-US" sz="1000" dirty="0"/>
-          </a:p>
-        </p:txBody>
-      </p:sp>
-      <p:pic>
-        <p:nvPicPr>
-          <p:cNvPr id="1028" name="Picture 4" descr="https://glassboxmedicine.files.wordpress.com/2019/02/roc-curve-v2.png?w=576"/>
-          <p:cNvPicPr>
-            <a:picLocks noChangeAspect="1" noChangeArrowheads="1"/>
-          </p:cNvPicPr>
-          <p:nvPr/>
-        </p:nvPicPr>
-        <p:blipFill>
-          <a:blip r:embed="rId6">
-            <a:extLst>
-              <a:ext uri="{28A0092B-C50C-407E-A947-70E740481C1C}">
-                <a14:useLocalDpi xmlns:a14="http://schemas.microsoft.com/office/drawing/2010/main" val="0"/>
-              </a:ext>
-            </a:extLst>
-          </a:blip>
-          <a:srcRect/>
-          <a:stretch>
-            <a:fillRect/>
-          </a:stretch>
-        </p:blipFill>
-        <p:spPr bwMode="auto">
-          <a:xfrm>
-            <a:off x="0" y="1785948"/>
-            <a:ext cx="4892475" cy="3669357"/>
-          </a:xfrm>
-          <a:prstGeom prst="rect">
-            <a:avLst/>
-          </a:prstGeom>
-          <a:noFill/>
-          <a:extLst>
-            <a:ext uri="{909E8E84-426E-40DD-AFC4-6F175D3DCCD1}">
-              <a14:hiddenFill xmlns:a14="http://schemas.microsoft.com/office/drawing/2010/main">
-                <a:solidFill>
-                  <a:srgbClr val="FFFFFF"/>
-                </a:solidFill>
-              </a14:hiddenFill>
-            </a:ext>
-          </a:extLst>
-        </p:spPr>
-      </p:pic>
-    </p:spTree>
-    <p:extLst>
-      <p:ext uri="{BB962C8B-B14F-4D97-AF65-F5344CB8AC3E}">
-        <p14:creationId xmlns:p14="http://schemas.microsoft.com/office/powerpoint/2010/main" val="4276133750"/>
-      </p:ext>
-    </p:extLst>
-  </p:cSld>
-  <p:clrMapOvr>
-    <a:masterClrMapping/>
-  </p:clrMapOvr>
-</p:sld>
-</file>
-
-<file path=ppt/slides/slide11.xml><?xml version="1.0" encoding="utf-8"?>
-<p:sld xmlns:a="http://schemas.openxmlformats.org/drawingml/2006/main" xmlns:r="http://schemas.openxmlformats.org/officeDocument/2006/relationships" xmlns:p="http://schemas.openxmlformats.org/presentationml/2006/main">
-  <p:cSld>
-    <p:spTree>
-      <p:nvGrpSpPr>
-        <p:cNvPr id="1" name=""/>
-        <p:cNvGrpSpPr/>
-        <p:nvPr/>
-      </p:nvGrpSpPr>
-      <p:grpSpPr>
-        <a:xfrm>
-          <a:off x="0" y="0"/>
-          <a:ext cx="0" cy="0"/>
-          <a:chOff x="0" y="0"/>
-          <a:chExt cx="0" cy="0"/>
-        </a:xfrm>
-      </p:grpSpPr>
-      <p:sp>
-        <p:nvSpPr>
-          <p:cNvPr id="2" name="Title 1"/>
-          <p:cNvSpPr>
-            <a:spLocks noGrp="1"/>
-          </p:cNvSpPr>
-          <p:nvPr>
-            <p:ph type="title"/>
-          </p:nvPr>
-        </p:nvSpPr>
-        <p:spPr/>
-        <p:txBody>
-          <a:bodyPr/>
-          <a:lstStyle/>
-          <a:p>
-            <a:r>
-              <a:rPr lang="en-US" dirty="0" smtClean="0"/>
               <a:t>References </a:t>
             </a:r>
             <a:endParaRPr lang="en-US" dirty="0"/>
@@ -4114,76 +3933,65 @@
           <a:p>
             <a:r>
               <a:rPr lang="en-US" dirty="0" smtClean="0"/>
-              <a:t>Filter outliers</a:t>
+              <a:t>PCA	 - Principal Component Analysis</a:t>
             </a:r>
             <a:endParaRPr lang="en-US" dirty="0"/>
           </a:p>
         </p:txBody>
       </p:sp>
-      <p:pic>
-        <p:nvPicPr>
-          <p:cNvPr id="4" name="Content Placeholder 3"/>
-          <p:cNvPicPr>
-            <a:picLocks noGrp="1" noChangeAspect="1"/>
-          </p:cNvPicPr>
+      <p:sp>
+        <p:nvSpPr>
+          <p:cNvPr id="3" name="Content Placeholder 2"/>
+          <p:cNvSpPr>
+            <a:spLocks noGrp="1"/>
+          </p:cNvSpPr>
           <p:nvPr>
             <p:ph idx="1"/>
           </p:nvPr>
-        </p:nvPicPr>
-        <p:blipFill rotWithShape="1">
-          <a:blip r:embed="rId2" cstate="print">
-            <a:extLst>
-              <a:ext uri="{28A0092B-C50C-407E-A947-70E740481C1C}">
-                <a14:useLocalDpi xmlns:a14="http://schemas.microsoft.com/office/drawing/2010/main" val="0"/>
-              </a:ext>
-            </a:extLst>
-          </a:blip>
-          <a:srcRect b="30435"/>
-          <a:stretch/>
-        </p:blipFill>
-        <p:spPr>
-          <a:xfrm>
-            <a:off x="3445471" y="1690688"/>
-            <a:ext cx="5535689" cy="4196896"/>
-          </a:xfrm>
-        </p:spPr>
-      </p:pic>
-      <p:sp>
-        <p:nvSpPr>
-          <p:cNvPr id="5" name="TextBox 4"/>
-          <p:cNvSpPr txBox="1"/>
-          <p:nvPr/>
-        </p:nvSpPr>
-        <p:spPr>
-          <a:xfrm>
-            <a:off x="9413675" y="6611779"/>
-            <a:ext cx="2778325" cy="246221"/>
-          </a:xfrm>
-          <a:prstGeom prst="rect">
-            <a:avLst/>
-          </a:prstGeom>
-          <a:noFill/>
-        </p:spPr>
-        <p:txBody>
-          <a:bodyPr wrap="none" rtlCol="0">
-            <a:spAutoFit/>
-          </a:bodyPr>
-          <a:lstStyle/>
-          <a:p>
-            <a:r>
-              <a:rPr lang="en-US" sz="1000" dirty="0" smtClean="0">
-                <a:hlinkClick r:id="rId3"/>
-              </a:rPr>
-              <a:t>https://en.wikipedia.org/wiki/Interquartile_range</a:t>
-            </a:r>
-            <a:endParaRPr lang="en-US" sz="1000" dirty="0"/>
+        </p:nvSpPr>
+        <p:spPr/>
+        <p:txBody>
+          <a:bodyPr/>
+          <a:lstStyle/>
+          <a:p>
+            <a:r>
+              <a:rPr lang="en-US" dirty="0" smtClean="0"/>
+              <a:t>Dimensionality reduction technique</a:t>
+            </a:r>
+          </a:p>
+          <a:p>
+            <a:r>
+              <a:rPr lang="en-US" dirty="0" smtClean="0"/>
+              <a:t>Transform high dimensional data into smaller-dimensional subspace</a:t>
+            </a:r>
+          </a:p>
+          <a:p>
+            <a:r>
+              <a:rPr lang="en-US" dirty="0" smtClean="0"/>
+              <a:t>Convert possibly correlated variables into set of values of linearly uncorrelated variables (PC: principal components)</a:t>
+            </a:r>
+          </a:p>
+          <a:p>
+            <a:r>
+              <a:rPr lang="en-US" dirty="0" smtClean="0"/>
+              <a:t>Linear combination of variables</a:t>
+            </a:r>
+          </a:p>
+          <a:p>
+            <a:r>
+              <a:rPr lang="en-US" dirty="0" smtClean="0"/>
+              <a:t>First principal component accounts for most variance</a:t>
+            </a:r>
+          </a:p>
+          <a:p>
+            <a:endParaRPr lang="en-US" dirty="0"/>
           </a:p>
         </p:txBody>
       </p:sp>
     </p:spTree>
     <p:extLst>
       <p:ext uri="{BB962C8B-B14F-4D97-AF65-F5344CB8AC3E}">
-        <p14:creationId xmlns:p14="http://schemas.microsoft.com/office/powerpoint/2010/main" val="3382557753"/>
+        <p14:creationId xmlns:p14="http://schemas.microsoft.com/office/powerpoint/2010/main" val="2685281253"/>
       </p:ext>
     </p:extLst>
   </p:cSld>
@@ -4227,7 +4035,7 @@
           <a:p>
             <a:r>
               <a:rPr lang="en-US" dirty="0" smtClean="0"/>
-              <a:t>PCA	 - Principal Component Analysis</a:t>
+              <a:t>Normalization</a:t>
             </a:r>
             <a:endParaRPr lang="en-US" dirty="0"/>
           </a:p>
@@ -4250,34 +4058,74 @@
           <a:p>
             <a:r>
               <a:rPr lang="en-US" dirty="0" smtClean="0"/>
-              <a:t>Dimensionality reduction technique</a:t>
+              <a:t>Log2</a:t>
             </a:r>
           </a:p>
           <a:p>
             <a:r>
               <a:rPr lang="en-US" dirty="0" smtClean="0"/>
-              <a:t>Transform high dimensional data into smaller-dimensional subspace</a:t>
+              <a:t>Median</a:t>
             </a:r>
           </a:p>
           <a:p>
             <a:r>
               <a:rPr lang="en-US" dirty="0" smtClean="0"/>
-              <a:t>Convert possibly correlated variables into set of values of linearly uncorrelated variables (PC: principal components)</a:t>
+              <a:t>Mean</a:t>
             </a:r>
           </a:p>
           <a:p>
             <a:r>
               <a:rPr lang="en-US" dirty="0" smtClean="0"/>
-              <a:t>Linear combination of variables</a:t>
-            </a:r>
-          </a:p>
-          <a:p>
+              <a:t>Variance </a:t>
+            </a:r>
+            <a:r>
+              <a:rPr lang="en-US" dirty="0"/>
+              <a:t>stabilizing normalization (VSN</a:t>
+            </a:r>
             <a:r>
               <a:rPr lang="en-US" dirty="0" smtClean="0"/>
-              <a:t>First principal component accounts for most variance</a:t>
-            </a:r>
-          </a:p>
-          <a:p>
+              <a:t>) [1] </a:t>
+            </a:r>
+          </a:p>
+          <a:p>
+            <a:r>
+              <a:rPr lang="en-US" dirty="0" smtClean="0"/>
+              <a:t>Quantile</a:t>
+            </a:r>
+          </a:p>
+          <a:p>
+            <a:r>
+              <a:rPr lang="en-US" dirty="0" smtClean="0"/>
+              <a:t>Cyclic </a:t>
+            </a:r>
+            <a:r>
+              <a:rPr lang="en-US" dirty="0"/>
+              <a:t>loess normalization (Cyclic Loess) </a:t>
+            </a:r>
+            <a:r>
+              <a:rPr lang="en-US" dirty="0" smtClean="0"/>
+              <a:t> [2]</a:t>
+            </a:r>
+          </a:p>
+          <a:p>
+            <a:r>
+              <a:rPr lang="en-US" dirty="0" smtClean="0"/>
+              <a:t>Global </a:t>
+            </a:r>
+            <a:r>
+              <a:rPr lang="en-US" dirty="0"/>
+              <a:t>robust linear regression normalization (RLR</a:t>
+            </a:r>
+            <a:r>
+              <a:rPr lang="en-US" dirty="0" smtClean="0"/>
+              <a:t>) [3]</a:t>
+            </a:r>
+          </a:p>
+          <a:p>
+            <a:r>
+              <a:rPr lang="en-US" dirty="0" smtClean="0"/>
+              <a:t>Global Intensity [3]</a:t>
+            </a:r>
             <a:endParaRPr lang="en-US" dirty="0"/>
           </a:p>
         </p:txBody>
@@ -4285,7 +4133,7 @@
     </p:spTree>
     <p:extLst>
       <p:ext uri="{BB962C8B-B14F-4D97-AF65-F5344CB8AC3E}">
-        <p14:creationId xmlns:p14="http://schemas.microsoft.com/office/powerpoint/2010/main" val="2685281253"/>
+        <p14:creationId xmlns:p14="http://schemas.microsoft.com/office/powerpoint/2010/main" val="2434613534"/>
       </p:ext>
     </p:extLst>
   </p:cSld>
@@ -4312,150 +4160,8 @@
           <a:chExt cx="0" cy="0"/>
         </a:xfrm>
       </p:grpSpPr>
-      <p:sp>
-        <p:nvSpPr>
-          <p:cNvPr id="2" name="Title 1"/>
-          <p:cNvSpPr>
-            <a:spLocks noGrp="1"/>
-          </p:cNvSpPr>
-          <p:nvPr>
-            <p:ph type="title"/>
-          </p:nvPr>
-        </p:nvSpPr>
-        <p:spPr/>
-        <p:txBody>
-          <a:bodyPr/>
-          <a:lstStyle/>
-          <a:p>
-            <a:r>
-              <a:rPr lang="en-US" dirty="0" smtClean="0"/>
-              <a:t>Normalization</a:t>
-            </a:r>
-            <a:endParaRPr lang="en-US" dirty="0"/>
-          </a:p>
-        </p:txBody>
-      </p:sp>
-      <p:sp>
-        <p:nvSpPr>
-          <p:cNvPr id="3" name="Content Placeholder 2"/>
-          <p:cNvSpPr>
-            <a:spLocks noGrp="1"/>
-          </p:cNvSpPr>
-          <p:nvPr>
-            <p:ph idx="1"/>
-          </p:nvPr>
-        </p:nvSpPr>
-        <p:spPr/>
-        <p:txBody>
-          <a:bodyPr/>
-          <a:lstStyle/>
-          <a:p>
-            <a:r>
-              <a:rPr lang="en-US" dirty="0" smtClean="0"/>
-              <a:t>Log2</a:t>
-            </a:r>
-          </a:p>
-          <a:p>
-            <a:r>
-              <a:rPr lang="en-US" dirty="0" smtClean="0"/>
-              <a:t>Median</a:t>
-            </a:r>
-          </a:p>
-          <a:p>
-            <a:r>
-              <a:rPr lang="en-US" dirty="0" smtClean="0"/>
-              <a:t>Mean</a:t>
-            </a:r>
-          </a:p>
-          <a:p>
-            <a:r>
-              <a:rPr lang="en-US" dirty="0" smtClean="0"/>
-              <a:t>Variance </a:t>
-            </a:r>
-            <a:r>
-              <a:rPr lang="en-US" dirty="0"/>
-              <a:t>stabilizing normalization (VSN</a:t>
-            </a:r>
-            <a:r>
-              <a:rPr lang="en-US" dirty="0" smtClean="0"/>
-              <a:t>) [1] </a:t>
-            </a:r>
-          </a:p>
-          <a:p>
-            <a:r>
-              <a:rPr lang="en-US" dirty="0" smtClean="0"/>
-              <a:t>Quantile</a:t>
-            </a:r>
-          </a:p>
-          <a:p>
-            <a:r>
-              <a:rPr lang="en-US" dirty="0" smtClean="0"/>
-              <a:t>Cyclic </a:t>
-            </a:r>
-            <a:r>
-              <a:rPr lang="en-US" dirty="0"/>
-              <a:t>loess normalization (Cyclic Loess) </a:t>
-            </a:r>
-            <a:r>
-              <a:rPr lang="en-US" dirty="0" smtClean="0"/>
-              <a:t> [2]</a:t>
-            </a:r>
-          </a:p>
-          <a:p>
-            <a:r>
-              <a:rPr lang="en-US" dirty="0" smtClean="0"/>
-              <a:t>Global </a:t>
-            </a:r>
-            <a:r>
-              <a:rPr lang="en-US" dirty="0"/>
-              <a:t>robust linear regression normalization (RLR</a:t>
-            </a:r>
-            <a:r>
-              <a:rPr lang="en-US" dirty="0" smtClean="0"/>
-              <a:t>) [3]</a:t>
-            </a:r>
-          </a:p>
-          <a:p>
-            <a:r>
-              <a:rPr lang="en-US" dirty="0" smtClean="0"/>
-              <a:t>Global Intensity [3]</a:t>
-            </a:r>
-            <a:endParaRPr lang="en-US" dirty="0"/>
-          </a:p>
-        </p:txBody>
-      </p:sp>
-    </p:spTree>
-    <p:extLst>
-      <p:ext uri="{BB962C8B-B14F-4D97-AF65-F5344CB8AC3E}">
-        <p14:creationId xmlns:p14="http://schemas.microsoft.com/office/powerpoint/2010/main" val="2434613534"/>
-      </p:ext>
-    </p:extLst>
-  </p:cSld>
-  <p:clrMapOvr>
-    <a:masterClrMapping/>
-  </p:clrMapOvr>
-</p:sld>
-</file>
-
-<file path=ppt/slides/slide6.xml><?xml version="1.0" encoding="utf-8"?>
-<p:sld xmlns:a="http://schemas.openxmlformats.org/drawingml/2006/main" xmlns:r="http://schemas.openxmlformats.org/officeDocument/2006/relationships" xmlns:p="http://schemas.openxmlformats.org/presentationml/2006/main">
-  <p:cSld>
-    <p:spTree>
-      <p:nvGrpSpPr>
-        <p:cNvPr id="1" name=""/>
-        <p:cNvGrpSpPr/>
-        <p:nvPr/>
-      </p:nvGrpSpPr>
-      <p:grpSpPr>
-        <a:xfrm>
-          <a:off x="0" y="0"/>
-          <a:ext cx="0" cy="0"/>
-          <a:chOff x="0" y="0"/>
-          <a:chExt cx="0" cy="0"/>
-        </a:xfrm>
-      </p:grpSpPr>
-      <mc:AlternateContent xmlns:mc="http://schemas.openxmlformats.org/markup-compatibility/2006">
-        <mc:Choice xmlns:a14="http://schemas.microsoft.com/office/drawing/2010/main" Requires="a14">
+      <mc:AlternateContent xmlns:mc="http://schemas.openxmlformats.org/markup-compatibility/2006" xmlns:a14="http://schemas.microsoft.com/office/drawing/2010/main">
+        <mc:Choice Requires="a14">
           <p:sp>
             <p:nvSpPr>
               <p:cNvPr id="3" name="Content Placeholder 2"/>
@@ -4860,13 +4566,7 @@
                               <a:rPr lang="en-US" i="1">
                                 <a:latin typeface="Cambria Math" panose="02040503050406030204" pitchFamily="18" charset="0"/>
                               </a:rPr>
-                              <m:t>𝑠𝑎𝑚𝑝𝑙𝑒</m:t>
-                            </m:r>
-                            <m:r>
-                              <a:rPr lang="en-US" i="1">
-                                <a:latin typeface="Cambria Math" panose="02040503050406030204" pitchFamily="18" charset="0"/>
-                              </a:rPr>
-                              <m:t>𝐼𝑛𝑡𝑒𝑛𝑠𝑖𝑡𝑦</m:t>
+                              <m:t>𝑠𝑎𝑚𝑝𝑙𝑒𝐼𝑛𝑡𝑒𝑛𝑠𝑖𝑡𝑦</m:t>
                             </m:r>
                           </m:num>
                           <m:den>
@@ -4939,7 +4639,7 @@
             </p:txBody>
           </p:sp>
         </mc:Choice>
-        <mc:Fallback>
+        <mc:Fallback xmlns="">
           <p:sp>
             <p:nvSpPr>
               <p:cNvPr id="3" name="Content Placeholder 2"/>
@@ -4990,7 +4690,7 @@
 </p:sld>
 </file>
 
-<file path=ppt/slides/slide7.xml><?xml version="1.0" encoding="utf-8"?>
+<file path=ppt/slides/slide6.xml><?xml version="1.0" encoding="utf-8"?>
 <p:sld xmlns:a="http://schemas.openxmlformats.org/drawingml/2006/main" xmlns:r="http://schemas.openxmlformats.org/officeDocument/2006/relationships" xmlns:p="http://schemas.openxmlformats.org/presentationml/2006/main">
   <p:cSld>
     <p:spTree>
@@ -5140,7 +4840,7 @@
 </p:sld>
 </file>
 
-<file path=ppt/slides/slide8.xml><?xml version="1.0" encoding="utf-8"?>
+<file path=ppt/slides/slide7.xml><?xml version="1.0" encoding="utf-8"?>
 <p:sld xmlns:a="http://schemas.openxmlformats.org/drawingml/2006/main" xmlns:r="http://schemas.openxmlformats.org/officeDocument/2006/relationships" xmlns:p="http://schemas.openxmlformats.org/presentationml/2006/main">
   <p:cSld>
     <p:spTree>
@@ -5598,6 +5298,179 @@
 </p:sld>
 </file>
 
+<file path=ppt/slides/slide8.xml><?xml version="1.0" encoding="utf-8"?>
+<p:sld xmlns:a="http://schemas.openxmlformats.org/drawingml/2006/main" xmlns:r="http://schemas.openxmlformats.org/officeDocument/2006/relationships" xmlns:p="http://schemas.openxmlformats.org/presentationml/2006/main">
+  <p:cSld>
+    <p:spTree>
+      <p:nvGrpSpPr>
+        <p:cNvPr id="1" name=""/>
+        <p:cNvGrpSpPr/>
+        <p:nvPr/>
+      </p:nvGrpSpPr>
+      <p:grpSpPr>
+        <a:xfrm>
+          <a:off x="0" y="0"/>
+          <a:ext cx="0" cy="0"/>
+          <a:chOff x="0" y="0"/>
+          <a:chExt cx="0" cy="0"/>
+        </a:xfrm>
+      </p:grpSpPr>
+      <p:sp>
+        <p:nvSpPr>
+          <p:cNvPr id="2" name="Title 1"/>
+          <p:cNvSpPr>
+            <a:spLocks noGrp="1"/>
+          </p:cNvSpPr>
+          <p:nvPr>
+            <p:ph type="title"/>
+          </p:nvPr>
+        </p:nvSpPr>
+        <p:spPr/>
+        <p:txBody>
+          <a:bodyPr/>
+          <a:lstStyle/>
+          <a:p>
+            <a:r>
+              <a:rPr lang="en-US" dirty="0" err="1" smtClean="0"/>
+              <a:t>DAtest</a:t>
+            </a:r>
+            <a:r>
+              <a:rPr lang="en-US" dirty="0" smtClean="0"/>
+              <a:t> </a:t>
+            </a:r>
+            <a:r>
+              <a:rPr lang="en-US" dirty="0"/>
+              <a:t>&amp; </a:t>
+            </a:r>
+            <a:r>
+              <a:rPr lang="en-US" dirty="0" err="1" smtClean="0"/>
+              <a:t>powerDA</a:t>
+            </a:r>
+            <a:r>
+              <a:rPr lang="en-US" dirty="0" smtClean="0"/>
+              <a:t> [4]</a:t>
+            </a:r>
+            <a:endParaRPr lang="en-US" dirty="0"/>
+          </a:p>
+        </p:txBody>
+      </p:sp>
+      <p:sp>
+        <p:nvSpPr>
+          <p:cNvPr id="3" name="Content Placeholder 2"/>
+          <p:cNvSpPr>
+            <a:spLocks noGrp="1"/>
+          </p:cNvSpPr>
+          <p:nvPr>
+            <p:ph idx="1"/>
+          </p:nvPr>
+        </p:nvSpPr>
+        <p:spPr/>
+        <p:txBody>
+          <a:bodyPr/>
+          <a:lstStyle/>
+          <a:p>
+            <a:r>
+              <a:rPr lang="en-US" dirty="0" smtClean="0"/>
+              <a:t>Comparing </a:t>
+            </a:r>
+            <a:r>
+              <a:rPr lang="en-US" dirty="0"/>
+              <a:t>different differential abundance </a:t>
+            </a:r>
+            <a:r>
+              <a:rPr lang="en-US" dirty="0" smtClean="0"/>
+              <a:t>methods</a:t>
+            </a:r>
+          </a:p>
+          <a:p>
+            <a:pPr lvl="1"/>
+            <a:r>
+              <a:rPr lang="en-US" dirty="0" smtClean="0"/>
+              <a:t>Microbial marker-gene analysis</a:t>
+            </a:r>
+          </a:p>
+          <a:p>
+            <a:pPr lvl="1"/>
+            <a:r>
+              <a:rPr lang="en-US" dirty="0" smtClean="0"/>
+              <a:t>RNA-</a:t>
+            </a:r>
+            <a:r>
+              <a:rPr lang="en-US" dirty="0" err="1" smtClean="0"/>
+              <a:t>seq</a:t>
+            </a:r>
+            <a:r>
+              <a:rPr lang="en-US" dirty="0" smtClean="0"/>
+              <a:t> analysis</a:t>
+            </a:r>
+          </a:p>
+          <a:p>
+            <a:pPr lvl="1"/>
+            <a:r>
+              <a:rPr lang="en-US" dirty="0" smtClean="0"/>
+              <a:t>Protein/metabolite abundance analysis</a:t>
+            </a:r>
+          </a:p>
+          <a:p>
+            <a:r>
+              <a:rPr lang="en-US" dirty="0" smtClean="0"/>
+              <a:t>Method:</a:t>
+            </a:r>
+          </a:p>
+          <a:p>
+            <a:pPr lvl="1"/>
+            <a:r>
+              <a:rPr lang="en-US" dirty="0" smtClean="0"/>
+              <a:t>Shuffle predictor variable (e.g. case/control)</a:t>
+            </a:r>
+          </a:p>
+          <a:p>
+            <a:pPr lvl="1"/>
+            <a:r>
+              <a:rPr lang="en-US" dirty="0" smtClean="0"/>
+              <a:t>Spike data for randomly chosen features</a:t>
+            </a:r>
+          </a:p>
+          <a:p>
+            <a:pPr lvl="1"/>
+            <a:r>
+              <a:rPr lang="en-US" dirty="0" smtClean="0"/>
+              <a:t>Apply tests and evaluate</a:t>
+            </a:r>
+          </a:p>
+          <a:p>
+            <a:pPr lvl="2"/>
+            <a:r>
+              <a:rPr lang="en-US" dirty="0" smtClean="0"/>
+              <a:t>Whether test finds spike-ins</a:t>
+            </a:r>
+          </a:p>
+          <a:p>
+            <a:pPr lvl="2"/>
+            <a:r>
+              <a:rPr lang="en-US" dirty="0" smtClean="0"/>
+              <a:t>Whether FDR is controlled</a:t>
+            </a:r>
+          </a:p>
+          <a:p>
+            <a:pPr lvl="1"/>
+            <a:endParaRPr lang="en-US" dirty="0"/>
+          </a:p>
+        </p:txBody>
+      </p:sp>
+    </p:spTree>
+    <p:extLst>
+      <p:ext uri="{BB962C8B-B14F-4D97-AF65-F5344CB8AC3E}">
+        <p14:creationId xmlns:p14="http://schemas.microsoft.com/office/powerpoint/2010/main" val="2449361005"/>
+      </p:ext>
+    </p:extLst>
+  </p:cSld>
+  <p:clrMapOvr>
+    <a:masterClrMapping/>
+  </p:clrMapOvr>
+</p:sld>
+</file>
+
 <file path=ppt/slides/slide9.xml><?xml version="1.0" encoding="utf-8"?>
 <p:sld xmlns:a="http://schemas.openxmlformats.org/drawingml/2006/main" xmlns:r="http://schemas.openxmlformats.org/officeDocument/2006/relationships" xmlns:p="http://schemas.openxmlformats.org/presentationml/2006/main">
   <p:cSld>
@@ -5631,137 +5504,144 @@
           <a:lstStyle/>
           <a:p>
             <a:r>
-              <a:rPr lang="en-US" dirty="0" err="1" smtClean="0"/>
-              <a:t>DAtest</a:t>
-            </a:r>
-            <a:r>
               <a:rPr lang="en-US" dirty="0" smtClean="0"/>
-              <a:t> </a:t>
-            </a:r>
-            <a:r>
-              <a:rPr lang="en-US" dirty="0"/>
-              <a:t>&amp; </a:t>
-            </a:r>
-            <a:r>
-              <a:rPr lang="en-US" dirty="0" err="1" smtClean="0"/>
-              <a:t>powerDA</a:t>
-            </a:r>
-            <a:r>
-              <a:rPr lang="en-US" dirty="0" smtClean="0"/>
-              <a:t> [4]</a:t>
+              <a:t>AUC &amp; power</a:t>
             </a:r>
             <a:endParaRPr lang="en-US" dirty="0"/>
           </a:p>
         </p:txBody>
       </p:sp>
-      <p:sp>
-        <p:nvSpPr>
-          <p:cNvPr id="3" name="Content Placeholder 2"/>
-          <p:cNvSpPr>
-            <a:spLocks noGrp="1"/>
-          </p:cNvSpPr>
+      <p:pic>
+        <p:nvPicPr>
+          <p:cNvPr id="1026" name="Picture 2" descr="Left: Definitions of terminologies in a statistical test. Right: An illustration of power and significance level in a simple statistical test, where the left and right bell curves are the densities of the test statistics under the null hypothesis and the alternative hypothesis, respectively.[14]"/>
+          <p:cNvPicPr>
+            <a:picLocks noGrp="1" noChangeAspect="1" noChangeArrowheads="1"/>
+          </p:cNvPicPr>
           <p:nvPr>
             <p:ph idx="1"/>
           </p:nvPr>
-        </p:nvSpPr>
-        <p:spPr/>
-        <p:txBody>
-          <a:bodyPr/>
-          <a:lstStyle/>
-          <a:p>
-            <a:r>
-              <a:rPr lang="en-US" dirty="0" smtClean="0"/>
-              <a:t>Comparing </a:t>
-            </a:r>
-            <a:r>
-              <a:rPr lang="en-US" dirty="0"/>
-              <a:t>different differential abundance </a:t>
-            </a:r>
-            <a:r>
-              <a:rPr lang="en-US" dirty="0" smtClean="0"/>
-              <a:t>methods</a:t>
-            </a:r>
-          </a:p>
-          <a:p>
-            <a:pPr lvl="1"/>
-            <a:r>
-              <a:rPr lang="en-US" dirty="0" smtClean="0"/>
-              <a:t>Microbial marker-gene analysis</a:t>
-            </a:r>
-          </a:p>
-          <a:p>
-            <a:pPr lvl="1"/>
-            <a:r>
-              <a:rPr lang="en-US" dirty="0" smtClean="0"/>
-              <a:t>RNA-</a:t>
-            </a:r>
-            <a:r>
-              <a:rPr lang="en-US" dirty="0" err="1" smtClean="0"/>
-              <a:t>seq</a:t>
-            </a:r>
-            <a:r>
-              <a:rPr lang="en-US" dirty="0" smtClean="0"/>
-              <a:t> analysis</a:t>
-            </a:r>
-          </a:p>
-          <a:p>
-            <a:pPr lvl="1"/>
-            <a:r>
-              <a:rPr lang="en-US" dirty="0" smtClean="0"/>
-              <a:t>Protein/metabolite abundance analysis</a:t>
-            </a:r>
-          </a:p>
-          <a:p>
-            <a:r>
-              <a:rPr lang="en-US" dirty="0" smtClean="0"/>
-              <a:t>Method:</a:t>
-            </a:r>
-          </a:p>
-          <a:p>
-            <a:pPr lvl="1"/>
-            <a:r>
-              <a:rPr lang="en-US" dirty="0" smtClean="0"/>
-              <a:t>Shuffle predictor variable (e.g. case/control)</a:t>
-            </a:r>
-          </a:p>
-          <a:p>
-            <a:pPr lvl="1"/>
-            <a:r>
-              <a:rPr lang="en-US" dirty="0" smtClean="0"/>
-              <a:t>Spike data for randomly chosen features</a:t>
-            </a:r>
-          </a:p>
-          <a:p>
-            <a:pPr lvl="1"/>
-            <a:r>
-              <a:rPr lang="en-US" dirty="0" smtClean="0"/>
-              <a:t>Apply tests and evaluate</a:t>
-            </a:r>
-          </a:p>
-          <a:p>
-            <a:pPr lvl="2"/>
-            <a:r>
-              <a:rPr lang="en-US" dirty="0" smtClean="0"/>
-              <a:t>Whether test finds spike-ins</a:t>
-            </a:r>
-          </a:p>
-          <a:p>
-            <a:pPr lvl="2"/>
-            <a:r>
-              <a:rPr lang="en-US" dirty="0" smtClean="0"/>
-              <a:t>Whether FDR is controlled</a:t>
-            </a:r>
-          </a:p>
-          <a:p>
-            <a:pPr lvl="1"/>
-            <a:endParaRPr lang="en-US" dirty="0"/>
-          </a:p>
-        </p:txBody>
-      </p:sp>
+        </p:nvPicPr>
+        <p:blipFill>
+          <a:blip r:embed="rId3">
+            <a:extLst>
+              <a:ext uri="{28A0092B-C50C-407E-A947-70E740481C1C}">
+                <a14:useLocalDpi xmlns:a14="http://schemas.microsoft.com/office/drawing/2010/main" val="0"/>
+              </a:ext>
+            </a:extLst>
+          </a:blip>
+          <a:srcRect/>
+          <a:stretch>
+            <a:fillRect/>
+          </a:stretch>
+        </p:blipFill>
+        <p:spPr bwMode="auto">
+          <a:xfrm>
+            <a:off x="4923785" y="2186624"/>
+            <a:ext cx="7221629" cy="3236989"/>
+          </a:xfrm>
+          <a:prstGeom prst="rect">
+            <a:avLst/>
+          </a:prstGeom>
+          <a:noFill/>
+          <a:extLst>
+            <a:ext uri="{909E8E84-426E-40DD-AFC4-6F175D3DCCD1}">
+              <a14:hiddenFill xmlns:a14="http://schemas.microsoft.com/office/drawing/2010/main">
+                <a:solidFill>
+                  <a:srgbClr val="FFFFFF"/>
+                </a:solidFill>
+              </a14:hiddenFill>
+            </a:ext>
+          </a:extLst>
+        </p:spPr>
+      </p:pic>
+      <p:sp>
+        <p:nvSpPr>
+          <p:cNvPr id="5" name="TextBox 4"/>
+          <p:cNvSpPr txBox="1"/>
+          <p:nvPr/>
+        </p:nvSpPr>
+        <p:spPr>
+          <a:xfrm>
+            <a:off x="4892475" y="6457890"/>
+            <a:ext cx="7407797" cy="400110"/>
+          </a:xfrm>
+          <a:prstGeom prst="rect">
+            <a:avLst/>
+          </a:prstGeom>
+          <a:noFill/>
+        </p:spPr>
+        <p:txBody>
+          <a:bodyPr wrap="none" rtlCol="0">
+            <a:spAutoFit/>
+          </a:bodyPr>
+          <a:lstStyle/>
+          <a:p>
+            <a:r>
+              <a:rPr lang="en-US" sz="1000" dirty="0" smtClean="0">
+                <a:hlinkClick r:id="rId4"/>
+              </a:rPr>
+              <a:t>https://glassboxmedicine.com/2019/02/23/measuring-performance-auc-auroc/</a:t>
+            </a:r>
+            <a:endParaRPr lang="en-US" sz="1000" dirty="0" smtClean="0">
+              <a:hlinkClick r:id="rId5"/>
+            </a:endParaRPr>
+          </a:p>
+          <a:p>
+            <a:r>
+              <a:rPr lang="en-US" sz="1000" dirty="0" smtClean="0">
+                <a:hlinkClick r:id="rId5"/>
+              </a:rPr>
+              <a:t>https://www.researchgate.net/figure/Left-Definitions-of-terminologies-in-a-statistical-test-Right-An-illustration-of-power_fig3_316927316</a:t>
+            </a:r>
+            <a:endParaRPr lang="en-US" sz="1000" dirty="0"/>
+          </a:p>
+        </p:txBody>
+      </p:sp>
+      <p:pic>
+        <p:nvPicPr>
+          <p:cNvPr id="1028" name="Picture 4" descr="https://glassboxmedicine.files.wordpress.com/2019/02/roc-curve-v2.png?w=576"/>
+          <p:cNvPicPr>
+            <a:picLocks noChangeAspect="1" noChangeArrowheads="1"/>
+          </p:cNvPicPr>
+          <p:nvPr/>
+        </p:nvPicPr>
+        <p:blipFill>
+          <a:blip r:embed="rId6">
+            <a:extLst>
+              <a:ext uri="{28A0092B-C50C-407E-A947-70E740481C1C}">
+                <a14:useLocalDpi xmlns:a14="http://schemas.microsoft.com/office/drawing/2010/main" val="0"/>
+              </a:ext>
+            </a:extLst>
+          </a:blip>
+          <a:srcRect/>
+          <a:stretch>
+            <a:fillRect/>
+          </a:stretch>
+        </p:blipFill>
+        <p:spPr bwMode="auto">
+          <a:xfrm>
+            <a:off x="0" y="1785948"/>
+            <a:ext cx="4892475" cy="3669357"/>
+          </a:xfrm>
+          <a:prstGeom prst="rect">
+            <a:avLst/>
+          </a:prstGeom>
+          <a:noFill/>
+          <a:extLst>
+            <a:ext uri="{909E8E84-426E-40DD-AFC4-6F175D3DCCD1}">
+              <a14:hiddenFill xmlns:a14="http://schemas.microsoft.com/office/drawing/2010/main">
+                <a:solidFill>
+                  <a:srgbClr val="FFFFFF"/>
+                </a:solidFill>
+              </a14:hiddenFill>
+            </a:ext>
+          </a:extLst>
+        </p:spPr>
+      </p:pic>
     </p:spTree>
     <p:extLst>
       <p:ext uri="{BB962C8B-B14F-4D97-AF65-F5344CB8AC3E}">
-        <p14:creationId xmlns:p14="http://schemas.microsoft.com/office/powerpoint/2010/main" val="2449361005"/>
+        <p14:creationId xmlns:p14="http://schemas.microsoft.com/office/powerpoint/2010/main" val="4276133750"/>
       </p:ext>
     </p:extLst>
   </p:cSld>

</xml_diff>